<commit_message>
Physics 2 and Graphics 2 Project 1 updated
</commit_message>
<xml_diff>
--- a/6022_Phys 2/D2D/W04 (constraints)/Constraints.pptx
+++ b/6022_Phys 2/D2D/W04 (constraints)/Constraints.pptx
@@ -9,9 +9,10 @@
     <p:sldId id="258" r:id="rId3"/>
     <p:sldId id="259" r:id="rId4"/>
     <p:sldId id="260" r:id="rId5"/>
-    <p:sldId id="261" r:id="rId6"/>
+    <p:sldId id="264" r:id="rId6"/>
     <p:sldId id="262" r:id="rId7"/>
     <p:sldId id="263" r:id="rId8"/>
+    <p:sldId id="261" r:id="rId9"/>
   </p:sldIdLst>
   <p:sldSz cx="12192000" cy="6858000"/>
   <p:notesSz cx="6858000" cy="9144000"/>
@@ -110,6 +111,11 @@
       </a:defRPr>
     </a:lvl9pPr>
   </p:defaultTextStyle>
+  <p:extLst>
+    <p:ext uri="{EFAFB233-063F-42B5-8137-9DF3F51BA10A}">
+      <p15:sldGuideLst xmlns:p15="http://schemas.microsoft.com/office/powerpoint/2012/main"/>
+    </p:ext>
+  </p:extLst>
 </p:presentation>
 </file>
 
@@ -244,7 +250,7 @@
           <a:p>
             <a:fld id="{B9A13E84-DB6D-4E37-88F2-D2B0DD34CF9B}" type="datetimeFigureOut">
               <a:rPr lang="en-CA" smtClean="0"/>
-              <a:t>2024-02-01</a:t>
+              <a:t>2024-02-09</a:t>
             </a:fld>
             <a:endParaRPr lang="en-CA"/>
           </a:p>
@@ -414,7 +420,7 @@
           <a:p>
             <a:fld id="{B9A13E84-DB6D-4E37-88F2-D2B0DD34CF9B}" type="datetimeFigureOut">
               <a:rPr lang="en-CA" smtClean="0"/>
-              <a:t>2024-02-01</a:t>
+              <a:t>2024-02-09</a:t>
             </a:fld>
             <a:endParaRPr lang="en-CA"/>
           </a:p>
@@ -594,7 +600,7 @@
           <a:p>
             <a:fld id="{B9A13E84-DB6D-4E37-88F2-D2B0DD34CF9B}" type="datetimeFigureOut">
               <a:rPr lang="en-CA" smtClean="0"/>
-              <a:t>2024-02-01</a:t>
+              <a:t>2024-02-09</a:t>
             </a:fld>
             <a:endParaRPr lang="en-CA"/>
           </a:p>
@@ -764,7 +770,7 @@
           <a:p>
             <a:fld id="{B9A13E84-DB6D-4E37-88F2-D2B0DD34CF9B}" type="datetimeFigureOut">
               <a:rPr lang="en-CA" smtClean="0"/>
-              <a:t>2024-02-01</a:t>
+              <a:t>2024-02-09</a:t>
             </a:fld>
             <a:endParaRPr lang="en-CA"/>
           </a:p>
@@ -1010,7 +1016,7 @@
           <a:p>
             <a:fld id="{B9A13E84-DB6D-4E37-88F2-D2B0DD34CF9B}" type="datetimeFigureOut">
               <a:rPr lang="en-CA" smtClean="0"/>
-              <a:t>2024-02-01</a:t>
+              <a:t>2024-02-09</a:t>
             </a:fld>
             <a:endParaRPr lang="en-CA"/>
           </a:p>
@@ -1242,7 +1248,7 @@
           <a:p>
             <a:fld id="{B9A13E84-DB6D-4E37-88F2-D2B0DD34CF9B}" type="datetimeFigureOut">
               <a:rPr lang="en-CA" smtClean="0"/>
-              <a:t>2024-02-01</a:t>
+              <a:t>2024-02-09</a:t>
             </a:fld>
             <a:endParaRPr lang="en-CA"/>
           </a:p>
@@ -1609,7 +1615,7 @@
           <a:p>
             <a:fld id="{B9A13E84-DB6D-4E37-88F2-D2B0DD34CF9B}" type="datetimeFigureOut">
               <a:rPr lang="en-CA" smtClean="0"/>
-              <a:t>2024-02-01</a:t>
+              <a:t>2024-02-09</a:t>
             </a:fld>
             <a:endParaRPr lang="en-CA"/>
           </a:p>
@@ -1727,7 +1733,7 @@
           <a:p>
             <a:fld id="{B9A13E84-DB6D-4E37-88F2-D2B0DD34CF9B}" type="datetimeFigureOut">
               <a:rPr lang="en-CA" smtClean="0"/>
-              <a:t>2024-02-01</a:t>
+              <a:t>2024-02-09</a:t>
             </a:fld>
             <a:endParaRPr lang="en-CA"/>
           </a:p>
@@ -1822,7 +1828,7 @@
           <a:p>
             <a:fld id="{B9A13E84-DB6D-4E37-88F2-D2B0DD34CF9B}" type="datetimeFigureOut">
               <a:rPr lang="en-CA" smtClean="0"/>
-              <a:t>2024-02-01</a:t>
+              <a:t>2024-02-09</a:t>
             </a:fld>
             <a:endParaRPr lang="en-CA"/>
           </a:p>
@@ -2099,7 +2105,7 @@
           <a:p>
             <a:fld id="{B9A13E84-DB6D-4E37-88F2-D2B0DD34CF9B}" type="datetimeFigureOut">
               <a:rPr lang="en-CA" smtClean="0"/>
-              <a:t>2024-02-01</a:t>
+              <a:t>2024-02-09</a:t>
             </a:fld>
             <a:endParaRPr lang="en-CA"/>
           </a:p>
@@ -2356,7 +2362,7 @@
           <a:p>
             <a:fld id="{B9A13E84-DB6D-4E37-88F2-D2B0DD34CF9B}" type="datetimeFigureOut">
               <a:rPr lang="en-CA" smtClean="0"/>
-              <a:t>2024-02-01</a:t>
+              <a:t>2024-02-09</a:t>
             </a:fld>
             <a:endParaRPr lang="en-CA"/>
           </a:p>
@@ -2569,7 +2575,7 @@
           <a:p>
             <a:fld id="{B9A13E84-DB6D-4E37-88F2-D2B0DD34CF9B}" type="datetimeFigureOut">
               <a:rPr lang="en-CA" smtClean="0"/>
-              <a:t>2024-02-01</a:t>
+              <a:t>2024-02-09</a:t>
             </a:fld>
             <a:endParaRPr lang="en-CA"/>
           </a:p>
@@ -3509,7 +3515,13 @@
   <p:cSld>
     <p:spTree>
       <p:nvGrpSpPr>
-        <p:cNvPr id="1" name=""/>
+        <p:cNvPr id="1" name="">
+          <a:extLst>
+            <a:ext uri="{FF2B5EF4-FFF2-40B4-BE49-F238E27FC236}">
+              <a16:creationId xmlns:a16="http://schemas.microsoft.com/office/drawing/2014/main" id="{8CEC044F-6F6F-5A7E-FB79-2116D8DD79A4}"/>
+            </a:ext>
+          </a:extLst>
+        </p:cNvPr>
         <p:cNvGrpSpPr/>
         <p:nvPr/>
       </p:nvGrpSpPr>
@@ -3526,7 +3538,7 @@
           <p:cNvPr id="6" name="Oval 5">
             <a:extLst>
               <a:ext uri="{FF2B5EF4-FFF2-40B4-BE49-F238E27FC236}">
-                <a16:creationId xmlns:a16="http://schemas.microsoft.com/office/drawing/2014/main" id="{A12C9EE6-8EF5-09D0-1746-4C9A7C0FFA43}"/>
+                <a16:creationId xmlns:a16="http://schemas.microsoft.com/office/drawing/2014/main" id="{17558BF0-0E04-6FD4-92B8-FC2534CD97CA}"/>
               </a:ext>
             </a:extLst>
           </p:cNvPr>
@@ -3575,7 +3587,7 @@
           <p:cNvPr id="7" name="Oval 6">
             <a:extLst>
               <a:ext uri="{FF2B5EF4-FFF2-40B4-BE49-F238E27FC236}">
-                <a16:creationId xmlns:a16="http://schemas.microsoft.com/office/drawing/2014/main" id="{DE9EC2B4-9620-A25E-0BCC-EB3030828854}"/>
+                <a16:creationId xmlns:a16="http://schemas.microsoft.com/office/drawing/2014/main" id="{48A2889B-9F00-CE8D-32F1-C28608F84746}"/>
               </a:ext>
             </a:extLst>
           </p:cNvPr>
@@ -3624,7 +3636,7 @@
           <p:cNvPr id="8" name="Oval 7">
             <a:extLst>
               <a:ext uri="{FF2B5EF4-FFF2-40B4-BE49-F238E27FC236}">
-                <a16:creationId xmlns:a16="http://schemas.microsoft.com/office/drawing/2014/main" id="{D10CE0F2-280F-9A31-2B88-F1C92C6DD1F7}"/>
+                <a16:creationId xmlns:a16="http://schemas.microsoft.com/office/drawing/2014/main" id="{E09E8825-617E-77D5-3805-CF428C384557}"/>
               </a:ext>
             </a:extLst>
           </p:cNvPr>
@@ -3673,7 +3685,7 @@
           <p:cNvPr id="9" name="Oval 8">
             <a:extLst>
               <a:ext uri="{FF2B5EF4-FFF2-40B4-BE49-F238E27FC236}">
-                <a16:creationId xmlns:a16="http://schemas.microsoft.com/office/drawing/2014/main" id="{E6C37F7D-DEFB-578E-58D1-43ACC5CEBE43}"/>
+                <a16:creationId xmlns:a16="http://schemas.microsoft.com/office/drawing/2014/main" id="{ED788443-EF60-7AE0-814A-F0D75FC24F90}"/>
               </a:ext>
             </a:extLst>
           </p:cNvPr>
@@ -3722,7 +3734,7 @@
           <p:cNvPr id="10" name="L-Shape 9">
             <a:extLst>
               <a:ext uri="{FF2B5EF4-FFF2-40B4-BE49-F238E27FC236}">
-                <a16:creationId xmlns:a16="http://schemas.microsoft.com/office/drawing/2014/main" id="{96B53D2B-8DCD-810C-47BD-0DF02A5BE16B}"/>
+                <a16:creationId xmlns:a16="http://schemas.microsoft.com/office/drawing/2014/main" id="{C3AE2822-13C6-B891-D297-F197B6AF39A2}"/>
               </a:ext>
             </a:extLst>
           </p:cNvPr>
@@ -3768,7 +3780,7 @@
           <p:cNvPr id="12" name="Straight Arrow Connector 11">
             <a:extLst>
               <a:ext uri="{FF2B5EF4-FFF2-40B4-BE49-F238E27FC236}">
-                <a16:creationId xmlns:a16="http://schemas.microsoft.com/office/drawing/2014/main" id="{F3565B32-12A9-3CC8-6012-C09A0E57902F}"/>
+                <a16:creationId xmlns:a16="http://schemas.microsoft.com/office/drawing/2014/main" id="{2E07E62B-33D1-5074-3FBB-FA6FB395140C}"/>
               </a:ext>
             </a:extLst>
           </p:cNvPr>
@@ -3810,7 +3822,7 @@
           <p:cNvPr id="13" name="Straight Arrow Connector 12">
             <a:extLst>
               <a:ext uri="{FF2B5EF4-FFF2-40B4-BE49-F238E27FC236}">
-                <a16:creationId xmlns:a16="http://schemas.microsoft.com/office/drawing/2014/main" id="{BB02D75D-9ACC-4B8D-D282-81DE91815C15}"/>
+                <a16:creationId xmlns:a16="http://schemas.microsoft.com/office/drawing/2014/main" id="{1F1EDEBD-EE6C-F710-51DF-C49D6AF809B3}"/>
               </a:ext>
             </a:extLst>
           </p:cNvPr>
@@ -3853,7 +3865,7 @@
           <p:cNvPr id="16" name="Straight Arrow Connector 15">
             <a:extLst>
               <a:ext uri="{FF2B5EF4-FFF2-40B4-BE49-F238E27FC236}">
-                <a16:creationId xmlns:a16="http://schemas.microsoft.com/office/drawing/2014/main" id="{3031EE19-A94E-02C7-7869-5E2A051F6003}"/>
+                <a16:creationId xmlns:a16="http://schemas.microsoft.com/office/drawing/2014/main" id="{553FC272-6FB5-739E-1D13-6FF97D82DC8E}"/>
               </a:ext>
             </a:extLst>
           </p:cNvPr>
@@ -3896,7 +3908,7 @@
           <p:cNvPr id="19" name="Straight Arrow Connector 18">
             <a:extLst>
               <a:ext uri="{FF2B5EF4-FFF2-40B4-BE49-F238E27FC236}">
-                <a16:creationId xmlns:a16="http://schemas.microsoft.com/office/drawing/2014/main" id="{1BCB6B7C-29FA-D851-1F26-1D1D5FBF74F6}"/>
+                <a16:creationId xmlns:a16="http://schemas.microsoft.com/office/drawing/2014/main" id="{3EF30420-51CC-3855-017B-60C78B926BB6}"/>
               </a:ext>
             </a:extLst>
           </p:cNvPr>
@@ -3939,7 +3951,7 @@
           <p:cNvPr id="23" name="L-Shape 22">
             <a:extLst>
               <a:ext uri="{FF2B5EF4-FFF2-40B4-BE49-F238E27FC236}">
-                <a16:creationId xmlns:a16="http://schemas.microsoft.com/office/drawing/2014/main" id="{D395BC5C-2AB7-37EC-E260-9ACCF8F8BE99}"/>
+                <a16:creationId xmlns:a16="http://schemas.microsoft.com/office/drawing/2014/main" id="{A4E5FD59-906E-770F-FA96-9C90351A019D}"/>
               </a:ext>
             </a:extLst>
           </p:cNvPr>
@@ -3948,7 +3960,7 @@
         </p:nvSpPr>
         <p:spPr>
           <a:xfrm>
-            <a:off x="6961239" y="3371508"/>
+            <a:off x="6966156" y="3008670"/>
             <a:ext cx="2222090" cy="1406013"/>
           </a:xfrm>
           <a:prstGeom prst="corner">
@@ -3985,7 +3997,7 @@
           <p:cNvPr id="26" name="Oval 25">
             <a:extLst>
               <a:ext uri="{FF2B5EF4-FFF2-40B4-BE49-F238E27FC236}">
-                <a16:creationId xmlns:a16="http://schemas.microsoft.com/office/drawing/2014/main" id="{E0DCA670-B4B8-1DC1-A800-1D3FAFFB23CD}"/>
+                <a16:creationId xmlns:a16="http://schemas.microsoft.com/office/drawing/2014/main" id="{1DC19217-CC05-4DDA-5DDA-631486F1BD42}"/>
               </a:ext>
             </a:extLst>
           </p:cNvPr>
@@ -4034,7 +4046,7 @@
           <p:cNvPr id="29" name="Oval 28">
             <a:extLst>
               <a:ext uri="{FF2B5EF4-FFF2-40B4-BE49-F238E27FC236}">
-                <a16:creationId xmlns:a16="http://schemas.microsoft.com/office/drawing/2014/main" id="{23EE547C-7FFE-109F-099D-787A16AC3C01}"/>
+                <a16:creationId xmlns:a16="http://schemas.microsoft.com/office/drawing/2014/main" id="{A7454CD2-EDC4-FF9E-567B-2B8E39C1A111}"/>
               </a:ext>
             </a:extLst>
           </p:cNvPr>
@@ -4083,7 +4095,7 @@
           <p:cNvPr id="34" name="Oval 33">
             <a:extLst>
               <a:ext uri="{FF2B5EF4-FFF2-40B4-BE49-F238E27FC236}">
-                <a16:creationId xmlns:a16="http://schemas.microsoft.com/office/drawing/2014/main" id="{A1835EE1-485A-9FFB-6455-E68A1BFF6C50}"/>
+                <a16:creationId xmlns:a16="http://schemas.microsoft.com/office/drawing/2014/main" id="{5FE7C43C-82AB-A472-25C6-65057A26A54F}"/>
               </a:ext>
             </a:extLst>
           </p:cNvPr>
@@ -4092,7 +4104,7 @@
         </p:nvSpPr>
         <p:spPr>
           <a:xfrm>
-            <a:off x="6966156" y="4414683"/>
+            <a:off x="6966156" y="4359425"/>
             <a:ext cx="521110" cy="521110"/>
           </a:xfrm>
           <a:prstGeom prst="ellipse">
@@ -4132,19 +4144,20 @@
           <p:cNvPr id="35" name="Straight Arrow Connector 34">
             <a:extLst>
               <a:ext uri="{FF2B5EF4-FFF2-40B4-BE49-F238E27FC236}">
-                <a16:creationId xmlns:a16="http://schemas.microsoft.com/office/drawing/2014/main" id="{CE3CF986-98A1-3DEC-69AA-7CEE3C9E00CB}"/>
+                <a16:creationId xmlns:a16="http://schemas.microsoft.com/office/drawing/2014/main" id="{5B2EEB52-33CE-618B-AAEA-7CF980F23732}"/>
               </a:ext>
             </a:extLst>
           </p:cNvPr>
           <p:cNvCxnSpPr>
             <a:cxnSpLocks/>
+            <a:endCxn id="26" idx="0"/>
           </p:cNvCxnSpPr>
           <p:nvPr/>
         </p:nvCxnSpPr>
         <p:spPr>
-          <a:xfrm>
-            <a:off x="7236545" y="4901382"/>
-            <a:ext cx="0" cy="403120"/>
+          <a:xfrm flipH="1">
+            <a:off x="7226711" y="4901382"/>
+            <a:ext cx="9834" cy="437531"/>
           </a:xfrm>
           <a:prstGeom prst="straightConnector1">
             <a:avLst/>
@@ -4173,7 +4186,7 @@
           <p:cNvPr id="40" name="Oval 39">
             <a:extLst>
               <a:ext uri="{FF2B5EF4-FFF2-40B4-BE49-F238E27FC236}">
-                <a16:creationId xmlns:a16="http://schemas.microsoft.com/office/drawing/2014/main" id="{E5967ECD-EDE9-E87C-E724-6B0F201A3C6B}"/>
+                <a16:creationId xmlns:a16="http://schemas.microsoft.com/office/drawing/2014/main" id="{B11310AF-124A-7C0C-A2B6-5637F23B02FB}"/>
               </a:ext>
             </a:extLst>
           </p:cNvPr>
@@ -4222,19 +4235,20 @@
           <p:cNvPr id="41" name="Straight Arrow Connector 40">
             <a:extLst>
               <a:ext uri="{FF2B5EF4-FFF2-40B4-BE49-F238E27FC236}">
-                <a16:creationId xmlns:a16="http://schemas.microsoft.com/office/drawing/2014/main" id="{F279DDBF-E94A-6ED1-FF13-CAF47161900A}"/>
+                <a16:creationId xmlns:a16="http://schemas.microsoft.com/office/drawing/2014/main" id="{1F3353A0-61B8-EC42-931D-A6EBAF6E096E}"/>
               </a:ext>
             </a:extLst>
           </p:cNvPr>
           <p:cNvCxnSpPr>
             <a:cxnSpLocks/>
+            <a:endCxn id="29" idx="0"/>
           </p:cNvCxnSpPr>
           <p:nvPr/>
         </p:nvCxnSpPr>
         <p:spPr>
           <a:xfrm>
             <a:off x="8893280" y="4901382"/>
-            <a:ext cx="0" cy="403120"/>
+            <a:ext cx="29494" cy="464571"/>
           </a:xfrm>
           <a:prstGeom prst="straightConnector1">
             <a:avLst/>
@@ -4263,7 +4277,7 @@
           <p:cNvPr id="42" name="Cube 41">
             <a:extLst>
               <a:ext uri="{FF2B5EF4-FFF2-40B4-BE49-F238E27FC236}">
-                <a16:creationId xmlns:a16="http://schemas.microsoft.com/office/drawing/2014/main" id="{ED5DCC3B-21D0-0488-7E32-FF1493087257}"/>
+                <a16:creationId xmlns:a16="http://schemas.microsoft.com/office/drawing/2014/main" id="{10481F5F-6D83-B69D-353D-DA916E0BF9AE}"/>
               </a:ext>
             </a:extLst>
           </p:cNvPr>
@@ -4314,7 +4328,7 @@
           <p:cNvPr id="44" name="Oval 43">
             <a:extLst>
               <a:ext uri="{FF2B5EF4-FFF2-40B4-BE49-F238E27FC236}">
-                <a16:creationId xmlns:a16="http://schemas.microsoft.com/office/drawing/2014/main" id="{CF449D9A-F0D6-8D70-875F-E4FD9A9FA305}"/>
+                <a16:creationId xmlns:a16="http://schemas.microsoft.com/office/drawing/2014/main" id="{22DAA9FB-14A8-3DE3-DE1E-64D9A42525E9}"/>
               </a:ext>
             </a:extLst>
           </p:cNvPr>
@@ -4363,7 +4377,7 @@
           <p:cNvPr id="47" name="Oval 46">
             <a:extLst>
               <a:ext uri="{FF2B5EF4-FFF2-40B4-BE49-F238E27FC236}">
-                <a16:creationId xmlns:a16="http://schemas.microsoft.com/office/drawing/2014/main" id="{1A718BB3-7256-CBDD-20AC-00C6EE6E3282}"/>
+                <a16:creationId xmlns:a16="http://schemas.microsoft.com/office/drawing/2014/main" id="{15F88180-8249-05DF-24F8-BC33D87D1B94}"/>
               </a:ext>
             </a:extLst>
           </p:cNvPr>
@@ -4372,7 +4386,7 @@
         </p:nvSpPr>
         <p:spPr>
           <a:xfrm>
-            <a:off x="2379406" y="1217970"/>
+            <a:off x="2992054" y="1418303"/>
             <a:ext cx="521110" cy="521110"/>
           </a:xfrm>
           <a:prstGeom prst="ellipse">
@@ -4407,10 +4421,335 @@
           </a:p>
         </p:txBody>
       </p:sp>
+      <p:cxnSp>
+        <p:nvCxnSpPr>
+          <p:cNvPr id="3" name="Straight Arrow Connector 2">
+            <a:extLst>
+              <a:ext uri="{FF2B5EF4-FFF2-40B4-BE49-F238E27FC236}">
+                <a16:creationId xmlns:a16="http://schemas.microsoft.com/office/drawing/2014/main" id="{F5360869-1172-25D4-E6E4-B3FA307771BF}"/>
+              </a:ext>
+            </a:extLst>
+          </p:cNvPr>
+          <p:cNvCxnSpPr>
+            <a:cxnSpLocks/>
+            <a:stCxn id="5" idx="4"/>
+            <a:endCxn id="17" idx="1"/>
+          </p:cNvCxnSpPr>
+          <p:nvPr/>
+        </p:nvCxnSpPr>
+        <p:spPr>
+          <a:xfrm flipV="1">
+            <a:off x="3817425" y="3180304"/>
+            <a:ext cx="1833780" cy="1898054"/>
+          </a:xfrm>
+          <a:prstGeom prst="straightConnector1">
+            <a:avLst/>
+          </a:prstGeom>
+          <a:ln w="66675">
+            <a:tailEnd type="none"/>
+          </a:ln>
+        </p:spPr>
+        <p:style>
+          <a:lnRef idx="1">
+            <a:schemeClr val="accent1"/>
+          </a:lnRef>
+          <a:fillRef idx="0">
+            <a:schemeClr val="accent1"/>
+          </a:fillRef>
+          <a:effectRef idx="0">
+            <a:schemeClr val="accent1"/>
+          </a:effectRef>
+          <a:fontRef idx="minor">
+            <a:schemeClr val="tx1"/>
+          </a:fontRef>
+        </p:style>
+      </p:cxnSp>
+      <p:sp>
+        <p:nvSpPr>
+          <p:cNvPr id="4" name="Oval 3">
+            <a:extLst>
+              <a:ext uri="{FF2B5EF4-FFF2-40B4-BE49-F238E27FC236}">
+                <a16:creationId xmlns:a16="http://schemas.microsoft.com/office/drawing/2014/main" id="{4C5716FF-A476-B19F-AD29-FA128380CACB}"/>
+              </a:ext>
+            </a:extLst>
+          </p:cNvPr>
+          <p:cNvSpPr/>
+          <p:nvPr/>
+        </p:nvSpPr>
+        <p:spPr>
+          <a:xfrm rot="16200000">
+            <a:off x="5474652" y="4798909"/>
+            <a:ext cx="521110" cy="521110"/>
+          </a:xfrm>
+          <a:prstGeom prst="ellipse">
+            <a:avLst/>
+          </a:prstGeom>
+          <a:solidFill>
+            <a:srgbClr val="92D050"/>
+          </a:solidFill>
+        </p:spPr>
+        <p:style>
+          <a:lnRef idx="2">
+            <a:schemeClr val="accent1">
+              <a:shade val="15000"/>
+            </a:schemeClr>
+          </a:lnRef>
+          <a:fillRef idx="1">
+            <a:schemeClr val="accent1"/>
+          </a:fillRef>
+          <a:effectRef idx="0">
+            <a:schemeClr val="accent1"/>
+          </a:effectRef>
+          <a:fontRef idx="minor">
+            <a:schemeClr val="lt1"/>
+          </a:fontRef>
+        </p:style>
+        <p:txBody>
+          <a:bodyPr rtlCol="0" anchor="ctr"/>
+          <a:lstStyle/>
+          <a:p>
+            <a:pPr algn="ctr"/>
+            <a:endParaRPr lang="en-CA"/>
+          </a:p>
+        </p:txBody>
+      </p:sp>
+      <p:sp>
+        <p:nvSpPr>
+          <p:cNvPr id="5" name="Oval 4">
+            <a:extLst>
+              <a:ext uri="{FF2B5EF4-FFF2-40B4-BE49-F238E27FC236}">
+                <a16:creationId xmlns:a16="http://schemas.microsoft.com/office/drawing/2014/main" id="{5E182813-8F7C-9CA6-A1DF-A9ED79B5CB25}"/>
+              </a:ext>
+            </a:extLst>
+          </p:cNvPr>
+          <p:cNvSpPr/>
+          <p:nvPr/>
+        </p:nvSpPr>
+        <p:spPr>
+          <a:xfrm rot="16200000">
+            <a:off x="3296315" y="4817803"/>
+            <a:ext cx="521110" cy="521110"/>
+          </a:xfrm>
+          <a:prstGeom prst="ellipse">
+            <a:avLst/>
+          </a:prstGeom>
+          <a:solidFill>
+            <a:srgbClr val="92D050"/>
+          </a:solidFill>
+        </p:spPr>
+        <p:style>
+          <a:lnRef idx="2">
+            <a:schemeClr val="accent1">
+              <a:shade val="15000"/>
+            </a:schemeClr>
+          </a:lnRef>
+          <a:fillRef idx="1">
+            <a:schemeClr val="accent1"/>
+          </a:fillRef>
+          <a:effectRef idx="0">
+            <a:schemeClr val="accent1"/>
+          </a:effectRef>
+          <a:fontRef idx="minor">
+            <a:schemeClr val="lt1"/>
+          </a:fontRef>
+        </p:style>
+        <p:txBody>
+          <a:bodyPr rtlCol="0" anchor="ctr"/>
+          <a:lstStyle/>
+          <a:p>
+            <a:pPr algn="ctr"/>
+            <a:endParaRPr lang="en-CA"/>
+          </a:p>
+        </p:txBody>
+      </p:sp>
+      <p:sp>
+        <p:nvSpPr>
+          <p:cNvPr id="11" name="Oval 10">
+            <a:extLst>
+              <a:ext uri="{FF2B5EF4-FFF2-40B4-BE49-F238E27FC236}">
+                <a16:creationId xmlns:a16="http://schemas.microsoft.com/office/drawing/2014/main" id="{3DC32237-528E-7364-01BE-F9A76AFD5263}"/>
+              </a:ext>
+            </a:extLst>
+          </p:cNvPr>
+          <p:cNvSpPr/>
+          <p:nvPr/>
+        </p:nvSpPr>
+        <p:spPr>
+          <a:xfrm rot="16200000">
+            <a:off x="3296315" y="3311101"/>
+            <a:ext cx="521110" cy="521110"/>
+          </a:xfrm>
+          <a:prstGeom prst="ellipse">
+            <a:avLst/>
+          </a:prstGeom>
+          <a:solidFill>
+            <a:srgbClr val="92D050"/>
+          </a:solidFill>
+        </p:spPr>
+        <p:style>
+          <a:lnRef idx="2">
+            <a:schemeClr val="accent1">
+              <a:shade val="15000"/>
+            </a:schemeClr>
+          </a:lnRef>
+          <a:fillRef idx="1">
+            <a:schemeClr val="accent1"/>
+          </a:fillRef>
+          <a:effectRef idx="0">
+            <a:schemeClr val="accent1"/>
+          </a:effectRef>
+          <a:fontRef idx="minor">
+            <a:schemeClr val="lt1"/>
+          </a:fontRef>
+        </p:style>
+        <p:txBody>
+          <a:bodyPr rtlCol="0" anchor="ctr"/>
+          <a:lstStyle/>
+          <a:p>
+            <a:pPr algn="ctr"/>
+            <a:endParaRPr lang="en-CA"/>
+          </a:p>
+        </p:txBody>
+      </p:sp>
+      <p:cxnSp>
+        <p:nvCxnSpPr>
+          <p:cNvPr id="14" name="Straight Arrow Connector 13">
+            <a:extLst>
+              <a:ext uri="{FF2B5EF4-FFF2-40B4-BE49-F238E27FC236}">
+                <a16:creationId xmlns:a16="http://schemas.microsoft.com/office/drawing/2014/main" id="{682B473B-5637-A3F6-0B40-8CDE242EF9E9}"/>
+              </a:ext>
+            </a:extLst>
+          </p:cNvPr>
+          <p:cNvCxnSpPr>
+            <a:cxnSpLocks/>
+            <a:stCxn id="11" idx="2"/>
+            <a:endCxn id="5" idx="6"/>
+          </p:cNvCxnSpPr>
+          <p:nvPr/>
+        </p:nvCxnSpPr>
+        <p:spPr>
+          <a:xfrm>
+            <a:off x="3556870" y="3832211"/>
+            <a:ext cx="0" cy="985592"/>
+          </a:xfrm>
+          <a:prstGeom prst="straightConnector1">
+            <a:avLst/>
+          </a:prstGeom>
+          <a:ln w="66675">
+            <a:tailEnd type="none"/>
+          </a:ln>
+        </p:spPr>
+        <p:style>
+          <a:lnRef idx="1">
+            <a:schemeClr val="accent1"/>
+          </a:lnRef>
+          <a:fillRef idx="0">
+            <a:schemeClr val="accent1"/>
+          </a:fillRef>
+          <a:effectRef idx="0">
+            <a:schemeClr val="accent1"/>
+          </a:effectRef>
+          <a:fontRef idx="minor">
+            <a:schemeClr val="tx1"/>
+          </a:fontRef>
+        </p:style>
+      </p:cxnSp>
+      <p:sp>
+        <p:nvSpPr>
+          <p:cNvPr id="17" name="Oval 16">
+            <a:extLst>
+              <a:ext uri="{FF2B5EF4-FFF2-40B4-BE49-F238E27FC236}">
+                <a16:creationId xmlns:a16="http://schemas.microsoft.com/office/drawing/2014/main" id="{08B3383E-E652-D8AA-022A-44D07317FB60}"/>
+              </a:ext>
+            </a:extLst>
+          </p:cNvPr>
+          <p:cNvSpPr/>
+          <p:nvPr/>
+        </p:nvSpPr>
+        <p:spPr>
+          <a:xfrm rot="16200000">
+            <a:off x="5574890" y="2735509"/>
+            <a:ext cx="521110" cy="521110"/>
+          </a:xfrm>
+          <a:prstGeom prst="ellipse">
+            <a:avLst/>
+          </a:prstGeom>
+          <a:solidFill>
+            <a:srgbClr val="92D050"/>
+          </a:solidFill>
+        </p:spPr>
+        <p:style>
+          <a:lnRef idx="2">
+            <a:schemeClr val="accent1">
+              <a:shade val="15000"/>
+            </a:schemeClr>
+          </a:lnRef>
+          <a:fillRef idx="1">
+            <a:schemeClr val="accent1"/>
+          </a:fillRef>
+          <a:effectRef idx="0">
+            <a:schemeClr val="accent1"/>
+          </a:effectRef>
+          <a:fontRef idx="minor">
+            <a:schemeClr val="lt1"/>
+          </a:fontRef>
+        </p:style>
+        <p:txBody>
+          <a:bodyPr rtlCol="0" anchor="ctr"/>
+          <a:lstStyle/>
+          <a:p>
+            <a:pPr algn="ctr"/>
+            <a:endParaRPr lang="en-CA"/>
+          </a:p>
+        </p:txBody>
+      </p:sp>
+      <p:cxnSp>
+        <p:nvCxnSpPr>
+          <p:cNvPr id="21" name="Straight Arrow Connector 20">
+            <a:extLst>
+              <a:ext uri="{FF2B5EF4-FFF2-40B4-BE49-F238E27FC236}">
+                <a16:creationId xmlns:a16="http://schemas.microsoft.com/office/drawing/2014/main" id="{86179CDA-BCA1-6B9C-B6E5-8E5BDF405299}"/>
+              </a:ext>
+            </a:extLst>
+          </p:cNvPr>
+          <p:cNvCxnSpPr>
+            <a:cxnSpLocks/>
+            <a:stCxn id="40" idx="2"/>
+            <a:endCxn id="34" idx="6"/>
+          </p:cNvCxnSpPr>
+          <p:nvPr/>
+        </p:nvCxnSpPr>
+        <p:spPr>
+          <a:xfrm flipH="1" flipV="1">
+            <a:off x="7487266" y="4619980"/>
+            <a:ext cx="1121178" cy="71917"/>
+          </a:xfrm>
+          <a:prstGeom prst="straightConnector1">
+            <a:avLst/>
+          </a:prstGeom>
+          <a:ln w="66675">
+            <a:tailEnd type="none"/>
+          </a:ln>
+        </p:spPr>
+        <p:style>
+          <a:lnRef idx="1">
+            <a:schemeClr val="accent1"/>
+          </a:lnRef>
+          <a:fillRef idx="0">
+            <a:schemeClr val="accent1"/>
+          </a:fillRef>
+          <a:effectRef idx="0">
+            <a:schemeClr val="accent1"/>
+          </a:effectRef>
+          <a:fontRef idx="minor">
+            <a:schemeClr val="tx1"/>
+          </a:fontRef>
+        </p:style>
+      </p:cxnSp>
     </p:spTree>
     <p:extLst>
       <p:ext uri="{BB962C8B-B14F-4D97-AF65-F5344CB8AC3E}">
-        <p14:creationId xmlns:p14="http://schemas.microsoft.com/office/powerpoint/2010/main" val="2190351829"/>
+        <p14:creationId xmlns:p14="http://schemas.microsoft.com/office/powerpoint/2010/main" val="1586826653"/>
       </p:ext>
     </p:extLst>
   </p:cSld>
@@ -5142,7 +5481,7 @@
         </p:nvSpPr>
         <p:spPr>
           <a:xfrm rot="16200000">
-            <a:off x="8834498" y="228480"/>
+            <a:off x="8362450" y="431260"/>
             <a:ext cx="521110" cy="521110"/>
           </a:xfrm>
           <a:prstGeom prst="ellipse">
@@ -5188,15 +5527,15 @@
           </p:cNvPr>
           <p:cNvCxnSpPr>
             <a:cxnSpLocks/>
-            <a:stCxn id="31" idx="1"/>
-            <a:endCxn id="33" idx="5"/>
+            <a:stCxn id="3" idx="4"/>
+            <a:endCxn id="33" idx="0"/>
           </p:cNvCxnSpPr>
           <p:nvPr/>
         </p:nvCxnSpPr>
         <p:spPr>
-          <a:xfrm flipH="1">
-            <a:off x="6395658" y="673275"/>
-            <a:ext cx="2515155" cy="2301085"/>
+          <a:xfrm flipV="1">
+            <a:off x="1777181" y="3039122"/>
+            <a:ext cx="1657227" cy="18894"/>
           </a:xfrm>
           <a:prstGeom prst="straightConnector1">
             <a:avLst/>
@@ -5234,7 +5573,7 @@
         </p:nvSpPr>
         <p:spPr>
           <a:xfrm rot="16200000">
-            <a:off x="5950863" y="2898045"/>
+            <a:off x="3434408" y="2778567"/>
             <a:ext cx="521110" cy="521110"/>
           </a:xfrm>
           <a:prstGeom prst="ellipse">
@@ -5721,6 +6060,515 @@
           <a:xfrm rot="16200000" flipH="1">
             <a:off x="8152285" y="4189581"/>
             <a:ext cx="9832" cy="410498"/>
+          </a:xfrm>
+          <a:prstGeom prst="straightConnector1">
+            <a:avLst/>
+          </a:prstGeom>
+          <a:ln w="66675">
+            <a:tailEnd type="none"/>
+          </a:ln>
+        </p:spPr>
+        <p:style>
+          <a:lnRef idx="1">
+            <a:schemeClr val="accent1"/>
+          </a:lnRef>
+          <a:fillRef idx="0">
+            <a:schemeClr val="accent1"/>
+          </a:fillRef>
+          <a:effectRef idx="0">
+            <a:schemeClr val="accent1"/>
+          </a:effectRef>
+          <a:fontRef idx="minor">
+            <a:schemeClr val="tx1"/>
+          </a:fontRef>
+        </p:style>
+      </p:cxnSp>
+      <p:sp>
+        <p:nvSpPr>
+          <p:cNvPr id="3" name="Oval 2">
+            <a:extLst>
+              <a:ext uri="{FF2B5EF4-FFF2-40B4-BE49-F238E27FC236}">
+                <a16:creationId xmlns:a16="http://schemas.microsoft.com/office/drawing/2014/main" id="{517E3C39-63D2-315B-7172-8E5D56ACAC24}"/>
+              </a:ext>
+            </a:extLst>
+          </p:cNvPr>
+          <p:cNvSpPr/>
+          <p:nvPr/>
+        </p:nvSpPr>
+        <p:spPr>
+          <a:xfrm rot="16200000">
+            <a:off x="1256071" y="2797461"/>
+            <a:ext cx="521110" cy="521110"/>
+          </a:xfrm>
+          <a:prstGeom prst="ellipse">
+            <a:avLst/>
+          </a:prstGeom>
+          <a:solidFill>
+            <a:srgbClr val="92D050"/>
+          </a:solidFill>
+        </p:spPr>
+        <p:style>
+          <a:lnRef idx="2">
+            <a:schemeClr val="accent1">
+              <a:shade val="15000"/>
+            </a:schemeClr>
+          </a:lnRef>
+          <a:fillRef idx="1">
+            <a:schemeClr val="accent1"/>
+          </a:fillRef>
+          <a:effectRef idx="0">
+            <a:schemeClr val="accent1"/>
+          </a:effectRef>
+          <a:fontRef idx="minor">
+            <a:schemeClr val="lt1"/>
+          </a:fontRef>
+        </p:style>
+        <p:txBody>
+          <a:bodyPr rtlCol="0" anchor="ctr"/>
+          <a:lstStyle/>
+          <a:p>
+            <a:pPr algn="ctr"/>
+            <a:endParaRPr lang="en-CA"/>
+          </a:p>
+        </p:txBody>
+      </p:sp>
+      <p:sp>
+        <p:nvSpPr>
+          <p:cNvPr id="14" name="Oval 13">
+            <a:extLst>
+              <a:ext uri="{FF2B5EF4-FFF2-40B4-BE49-F238E27FC236}">
+                <a16:creationId xmlns:a16="http://schemas.microsoft.com/office/drawing/2014/main" id="{38CFC4BF-7EE8-4B89-5494-C6FE9B09C4FC}"/>
+              </a:ext>
+            </a:extLst>
+          </p:cNvPr>
+          <p:cNvSpPr/>
+          <p:nvPr/>
+        </p:nvSpPr>
+        <p:spPr>
+          <a:xfrm rot="16200000">
+            <a:off x="1256071" y="1290759"/>
+            <a:ext cx="521110" cy="521110"/>
+          </a:xfrm>
+          <a:prstGeom prst="ellipse">
+            <a:avLst/>
+          </a:prstGeom>
+          <a:solidFill>
+            <a:srgbClr val="92D050"/>
+          </a:solidFill>
+        </p:spPr>
+        <p:style>
+          <a:lnRef idx="2">
+            <a:schemeClr val="accent1">
+              <a:shade val="15000"/>
+            </a:schemeClr>
+          </a:lnRef>
+          <a:fillRef idx="1">
+            <a:schemeClr val="accent1"/>
+          </a:fillRef>
+          <a:effectRef idx="0">
+            <a:schemeClr val="accent1"/>
+          </a:effectRef>
+          <a:fontRef idx="minor">
+            <a:schemeClr val="lt1"/>
+          </a:fontRef>
+        </p:style>
+        <p:txBody>
+          <a:bodyPr rtlCol="0" anchor="ctr"/>
+          <a:lstStyle/>
+          <a:p>
+            <a:pPr algn="ctr"/>
+            <a:endParaRPr lang="en-CA"/>
+          </a:p>
+        </p:txBody>
+      </p:sp>
+      <p:cxnSp>
+        <p:nvCxnSpPr>
+          <p:cNvPr id="15" name="Straight Arrow Connector 14">
+            <a:extLst>
+              <a:ext uri="{FF2B5EF4-FFF2-40B4-BE49-F238E27FC236}">
+                <a16:creationId xmlns:a16="http://schemas.microsoft.com/office/drawing/2014/main" id="{5F0E59BF-9CEB-58E2-DBC1-68F3DFEBE08D}"/>
+              </a:ext>
+            </a:extLst>
+          </p:cNvPr>
+          <p:cNvCxnSpPr>
+            <a:cxnSpLocks/>
+            <a:stCxn id="14" idx="2"/>
+            <a:endCxn id="3" idx="6"/>
+          </p:cNvCxnSpPr>
+          <p:nvPr/>
+        </p:nvCxnSpPr>
+        <p:spPr>
+          <a:xfrm>
+            <a:off x="1516626" y="1811869"/>
+            <a:ext cx="0" cy="985592"/>
+          </a:xfrm>
+          <a:prstGeom prst="straightConnector1">
+            <a:avLst/>
+          </a:prstGeom>
+          <a:ln w="66675">
+            <a:tailEnd type="none"/>
+          </a:ln>
+        </p:spPr>
+        <p:style>
+          <a:lnRef idx="1">
+            <a:schemeClr val="accent1"/>
+          </a:lnRef>
+          <a:fillRef idx="0">
+            <a:schemeClr val="accent1"/>
+          </a:fillRef>
+          <a:effectRef idx="0">
+            <a:schemeClr val="accent1"/>
+          </a:effectRef>
+          <a:fontRef idx="minor">
+            <a:schemeClr val="tx1"/>
+          </a:fontRef>
+        </p:style>
+      </p:cxnSp>
+      <p:sp>
+        <p:nvSpPr>
+          <p:cNvPr id="28" name="Oval 27">
+            <a:extLst>
+              <a:ext uri="{FF2B5EF4-FFF2-40B4-BE49-F238E27FC236}">
+                <a16:creationId xmlns:a16="http://schemas.microsoft.com/office/drawing/2014/main" id="{E6DD0DE5-93EF-1F35-F4E9-8A158BDBDB4D}"/>
+              </a:ext>
+            </a:extLst>
+          </p:cNvPr>
+          <p:cNvSpPr/>
+          <p:nvPr/>
+        </p:nvSpPr>
+        <p:spPr>
+          <a:xfrm rot="16200000">
+            <a:off x="7843174" y="5295248"/>
+            <a:ext cx="521110" cy="521110"/>
+          </a:xfrm>
+          <a:prstGeom prst="ellipse">
+            <a:avLst/>
+          </a:prstGeom>
+          <a:solidFill>
+            <a:srgbClr val="92D050"/>
+          </a:solidFill>
+        </p:spPr>
+        <p:style>
+          <a:lnRef idx="2">
+            <a:schemeClr val="accent1">
+              <a:shade val="15000"/>
+            </a:schemeClr>
+          </a:lnRef>
+          <a:fillRef idx="1">
+            <a:schemeClr val="accent1"/>
+          </a:fillRef>
+          <a:effectRef idx="0">
+            <a:schemeClr val="accent1"/>
+          </a:effectRef>
+          <a:fontRef idx="minor">
+            <a:schemeClr val="lt1"/>
+          </a:fontRef>
+        </p:style>
+        <p:txBody>
+          <a:bodyPr rtlCol="0" anchor="ctr"/>
+          <a:lstStyle/>
+          <a:p>
+            <a:pPr algn="ctr"/>
+            <a:endParaRPr lang="en-CA"/>
+          </a:p>
+        </p:txBody>
+      </p:sp>
+      <p:cxnSp>
+        <p:nvCxnSpPr>
+          <p:cNvPr id="34" name="Straight Arrow Connector 33">
+            <a:extLst>
+              <a:ext uri="{FF2B5EF4-FFF2-40B4-BE49-F238E27FC236}">
+                <a16:creationId xmlns:a16="http://schemas.microsoft.com/office/drawing/2014/main" id="{ADA5D5F8-3D56-3FC6-47AA-886C7D384555}"/>
+              </a:ext>
+            </a:extLst>
+          </p:cNvPr>
+          <p:cNvCxnSpPr>
+            <a:cxnSpLocks/>
+            <a:stCxn id="36" idx="4"/>
+            <a:endCxn id="35" idx="0"/>
+          </p:cNvCxnSpPr>
+          <p:nvPr/>
+        </p:nvCxnSpPr>
+        <p:spPr>
+          <a:xfrm flipV="1">
+            <a:off x="6374992" y="3211489"/>
+            <a:ext cx="1657227" cy="18894"/>
+          </a:xfrm>
+          <a:prstGeom prst="straightConnector1">
+            <a:avLst/>
+          </a:prstGeom>
+          <a:ln w="66675">
+            <a:tailEnd type="none"/>
+          </a:ln>
+        </p:spPr>
+        <p:style>
+          <a:lnRef idx="1">
+            <a:schemeClr val="accent1"/>
+          </a:lnRef>
+          <a:fillRef idx="0">
+            <a:schemeClr val="accent1"/>
+          </a:fillRef>
+          <a:effectRef idx="0">
+            <a:schemeClr val="accent1"/>
+          </a:effectRef>
+          <a:fontRef idx="minor">
+            <a:schemeClr val="tx1"/>
+          </a:fontRef>
+        </p:style>
+      </p:cxnSp>
+      <p:sp>
+        <p:nvSpPr>
+          <p:cNvPr id="35" name="Oval 34">
+            <a:extLst>
+              <a:ext uri="{FF2B5EF4-FFF2-40B4-BE49-F238E27FC236}">
+                <a16:creationId xmlns:a16="http://schemas.microsoft.com/office/drawing/2014/main" id="{AE59B424-9B09-81D6-1855-15EE59D5D739}"/>
+              </a:ext>
+            </a:extLst>
+          </p:cNvPr>
+          <p:cNvSpPr/>
+          <p:nvPr/>
+        </p:nvSpPr>
+        <p:spPr>
+          <a:xfrm rot="16200000">
+            <a:off x="8032219" y="2950934"/>
+            <a:ext cx="521110" cy="521110"/>
+          </a:xfrm>
+          <a:prstGeom prst="ellipse">
+            <a:avLst/>
+          </a:prstGeom>
+          <a:solidFill>
+            <a:srgbClr val="92D050"/>
+          </a:solidFill>
+        </p:spPr>
+        <p:style>
+          <a:lnRef idx="2">
+            <a:schemeClr val="accent1">
+              <a:shade val="15000"/>
+            </a:schemeClr>
+          </a:lnRef>
+          <a:fillRef idx="1">
+            <a:schemeClr val="accent1"/>
+          </a:fillRef>
+          <a:effectRef idx="0">
+            <a:schemeClr val="accent1"/>
+          </a:effectRef>
+          <a:fontRef idx="minor">
+            <a:schemeClr val="lt1"/>
+          </a:fontRef>
+        </p:style>
+        <p:txBody>
+          <a:bodyPr rtlCol="0" anchor="ctr"/>
+          <a:lstStyle/>
+          <a:p>
+            <a:pPr algn="ctr"/>
+            <a:endParaRPr lang="en-CA"/>
+          </a:p>
+        </p:txBody>
+      </p:sp>
+      <p:sp>
+        <p:nvSpPr>
+          <p:cNvPr id="36" name="Oval 35">
+            <a:extLst>
+              <a:ext uri="{FF2B5EF4-FFF2-40B4-BE49-F238E27FC236}">
+                <a16:creationId xmlns:a16="http://schemas.microsoft.com/office/drawing/2014/main" id="{B19F20C6-466E-10B8-DDD8-97108AD9EDCA}"/>
+              </a:ext>
+            </a:extLst>
+          </p:cNvPr>
+          <p:cNvSpPr/>
+          <p:nvPr/>
+        </p:nvSpPr>
+        <p:spPr>
+          <a:xfrm rot="16200000">
+            <a:off x="5853882" y="2969828"/>
+            <a:ext cx="521110" cy="521110"/>
+          </a:xfrm>
+          <a:prstGeom prst="ellipse">
+            <a:avLst/>
+          </a:prstGeom>
+          <a:solidFill>
+            <a:srgbClr val="92D050"/>
+          </a:solidFill>
+        </p:spPr>
+        <p:style>
+          <a:lnRef idx="2">
+            <a:schemeClr val="accent1">
+              <a:shade val="15000"/>
+            </a:schemeClr>
+          </a:lnRef>
+          <a:fillRef idx="1">
+            <a:schemeClr val="accent1"/>
+          </a:fillRef>
+          <a:effectRef idx="0">
+            <a:schemeClr val="accent1"/>
+          </a:effectRef>
+          <a:fontRef idx="minor">
+            <a:schemeClr val="lt1"/>
+          </a:fontRef>
+        </p:style>
+        <p:txBody>
+          <a:bodyPr rtlCol="0" anchor="ctr"/>
+          <a:lstStyle/>
+          <a:p>
+            <a:pPr algn="ctr"/>
+            <a:endParaRPr lang="en-CA"/>
+          </a:p>
+        </p:txBody>
+      </p:sp>
+      <p:sp>
+        <p:nvSpPr>
+          <p:cNvPr id="37" name="Oval 36">
+            <a:extLst>
+              <a:ext uri="{FF2B5EF4-FFF2-40B4-BE49-F238E27FC236}">
+                <a16:creationId xmlns:a16="http://schemas.microsoft.com/office/drawing/2014/main" id="{A061BDA1-5E23-7E76-9F4D-81C6285740F1}"/>
+              </a:ext>
+            </a:extLst>
+          </p:cNvPr>
+          <p:cNvSpPr/>
+          <p:nvPr/>
+        </p:nvSpPr>
+        <p:spPr>
+          <a:xfrm rot="16200000">
+            <a:off x="5853882" y="1463126"/>
+            <a:ext cx="521110" cy="521110"/>
+          </a:xfrm>
+          <a:prstGeom prst="ellipse">
+            <a:avLst/>
+          </a:prstGeom>
+          <a:solidFill>
+            <a:srgbClr val="92D050"/>
+          </a:solidFill>
+        </p:spPr>
+        <p:style>
+          <a:lnRef idx="2">
+            <a:schemeClr val="accent1">
+              <a:shade val="15000"/>
+            </a:schemeClr>
+          </a:lnRef>
+          <a:fillRef idx="1">
+            <a:schemeClr val="accent1"/>
+          </a:fillRef>
+          <a:effectRef idx="0">
+            <a:schemeClr val="accent1"/>
+          </a:effectRef>
+          <a:fontRef idx="minor">
+            <a:schemeClr val="lt1"/>
+          </a:fontRef>
+        </p:style>
+        <p:txBody>
+          <a:bodyPr rtlCol="0" anchor="ctr"/>
+          <a:lstStyle/>
+          <a:p>
+            <a:pPr algn="ctr"/>
+            <a:endParaRPr lang="en-CA"/>
+          </a:p>
+        </p:txBody>
+      </p:sp>
+      <p:cxnSp>
+        <p:nvCxnSpPr>
+          <p:cNvPr id="38" name="Straight Arrow Connector 37">
+            <a:extLst>
+              <a:ext uri="{FF2B5EF4-FFF2-40B4-BE49-F238E27FC236}">
+                <a16:creationId xmlns:a16="http://schemas.microsoft.com/office/drawing/2014/main" id="{59CA7C9C-7C37-8096-C66F-9A80977F902B}"/>
+              </a:ext>
+            </a:extLst>
+          </p:cNvPr>
+          <p:cNvCxnSpPr>
+            <a:cxnSpLocks/>
+            <a:stCxn id="37" idx="2"/>
+            <a:endCxn id="36" idx="6"/>
+          </p:cNvCxnSpPr>
+          <p:nvPr/>
+        </p:nvCxnSpPr>
+        <p:spPr>
+          <a:xfrm>
+            <a:off x="6114437" y="1984236"/>
+            <a:ext cx="0" cy="985592"/>
+          </a:xfrm>
+          <a:prstGeom prst="straightConnector1">
+            <a:avLst/>
+          </a:prstGeom>
+          <a:ln w="66675">
+            <a:tailEnd type="none"/>
+          </a:ln>
+        </p:spPr>
+        <p:style>
+          <a:lnRef idx="1">
+            <a:schemeClr val="accent1"/>
+          </a:lnRef>
+          <a:fillRef idx="0">
+            <a:schemeClr val="accent1"/>
+          </a:fillRef>
+          <a:effectRef idx="0">
+            <a:schemeClr val="accent1"/>
+          </a:effectRef>
+          <a:fontRef idx="minor">
+            <a:schemeClr val="tx1"/>
+          </a:fontRef>
+        </p:style>
+      </p:cxnSp>
+      <p:cxnSp>
+        <p:nvCxnSpPr>
+          <p:cNvPr id="39" name="Straight Arrow Connector 38">
+            <a:extLst>
+              <a:ext uri="{FF2B5EF4-FFF2-40B4-BE49-F238E27FC236}">
+                <a16:creationId xmlns:a16="http://schemas.microsoft.com/office/drawing/2014/main" id="{6CA10EA1-F1BA-B5AF-5295-1BCF565F90A5}"/>
+              </a:ext>
+            </a:extLst>
+          </p:cNvPr>
+          <p:cNvCxnSpPr>
+            <a:cxnSpLocks/>
+            <a:stCxn id="37" idx="4"/>
+            <a:endCxn id="35" idx="7"/>
+          </p:cNvCxnSpPr>
+          <p:nvPr/>
+        </p:nvCxnSpPr>
+        <p:spPr>
+          <a:xfrm>
+            <a:off x="6374992" y="1723681"/>
+            <a:ext cx="1733542" cy="1303568"/>
+          </a:xfrm>
+          <a:prstGeom prst="straightConnector1">
+            <a:avLst/>
+          </a:prstGeom>
+          <a:ln w="66675">
+            <a:tailEnd type="none"/>
+          </a:ln>
+        </p:spPr>
+        <p:style>
+          <a:lnRef idx="1">
+            <a:schemeClr val="accent1"/>
+          </a:lnRef>
+          <a:fillRef idx="0">
+            <a:schemeClr val="accent1"/>
+          </a:fillRef>
+          <a:effectRef idx="0">
+            <a:schemeClr val="accent1"/>
+          </a:effectRef>
+          <a:fontRef idx="minor">
+            <a:schemeClr val="tx1"/>
+          </a:fontRef>
+        </p:style>
+      </p:cxnSp>
+      <p:cxnSp>
+        <p:nvCxnSpPr>
+          <p:cNvPr id="42" name="Straight Arrow Connector 41">
+            <a:extLst>
+              <a:ext uri="{FF2B5EF4-FFF2-40B4-BE49-F238E27FC236}">
+                <a16:creationId xmlns:a16="http://schemas.microsoft.com/office/drawing/2014/main" id="{20B8CF27-45A4-6984-39F9-4EE5AE53534B}"/>
+              </a:ext>
+            </a:extLst>
+          </p:cNvPr>
+          <p:cNvCxnSpPr>
+            <a:cxnSpLocks/>
+            <a:stCxn id="36" idx="5"/>
+            <a:endCxn id="31" idx="1"/>
+          </p:cNvCxnSpPr>
+          <p:nvPr/>
+        </p:nvCxnSpPr>
+        <p:spPr>
+          <a:xfrm flipV="1">
+            <a:off x="6298677" y="876055"/>
+            <a:ext cx="2140088" cy="2170088"/>
           </a:xfrm>
           <a:prstGeom prst="straightConnector1">
             <a:avLst/>
@@ -5992,6 +6840,1249 @@
     <p:extLst>
       <p:ext uri="{BB962C8B-B14F-4D97-AF65-F5344CB8AC3E}">
         <p14:creationId xmlns:p14="http://schemas.microsoft.com/office/powerpoint/2010/main" val="4133730359"/>
+      </p:ext>
+    </p:extLst>
+  </p:cSld>
+  <p:clrMapOvr>
+    <a:masterClrMapping/>
+  </p:clrMapOvr>
+</p:sld>
+</file>
+
+<file path=ppt/slides/slide8.xml><?xml version="1.0" encoding="utf-8"?>
+<p:sld xmlns:a="http://schemas.openxmlformats.org/drawingml/2006/main" xmlns:r="http://schemas.openxmlformats.org/officeDocument/2006/relationships" xmlns:p="http://schemas.openxmlformats.org/presentationml/2006/main">
+  <p:cSld>
+    <p:spTree>
+      <p:nvGrpSpPr>
+        <p:cNvPr id="1" name=""/>
+        <p:cNvGrpSpPr/>
+        <p:nvPr/>
+      </p:nvGrpSpPr>
+      <p:grpSpPr>
+        <a:xfrm>
+          <a:off x="0" y="0"/>
+          <a:ext cx="0" cy="0"/>
+          <a:chOff x="0" y="0"/>
+          <a:chExt cx="0" cy="0"/>
+        </a:xfrm>
+      </p:grpSpPr>
+      <p:sp>
+        <p:nvSpPr>
+          <p:cNvPr id="6" name="Oval 5">
+            <a:extLst>
+              <a:ext uri="{FF2B5EF4-FFF2-40B4-BE49-F238E27FC236}">
+                <a16:creationId xmlns:a16="http://schemas.microsoft.com/office/drawing/2014/main" id="{A12C9EE6-8EF5-09D0-1746-4C9A7C0FFA43}"/>
+              </a:ext>
+            </a:extLst>
+          </p:cNvPr>
+          <p:cNvSpPr/>
+          <p:nvPr/>
+        </p:nvSpPr>
+        <p:spPr>
+          <a:xfrm>
+            <a:off x="757084" y="496528"/>
+            <a:ext cx="521110" cy="521110"/>
+          </a:xfrm>
+          <a:prstGeom prst="ellipse">
+            <a:avLst/>
+          </a:prstGeom>
+          <a:solidFill>
+            <a:srgbClr val="92D050"/>
+          </a:solidFill>
+        </p:spPr>
+        <p:style>
+          <a:lnRef idx="2">
+            <a:schemeClr val="accent1">
+              <a:shade val="15000"/>
+            </a:schemeClr>
+          </a:lnRef>
+          <a:fillRef idx="1">
+            <a:schemeClr val="accent1"/>
+          </a:fillRef>
+          <a:effectRef idx="0">
+            <a:schemeClr val="accent1"/>
+          </a:effectRef>
+          <a:fontRef idx="minor">
+            <a:schemeClr val="lt1"/>
+          </a:fontRef>
+        </p:style>
+        <p:txBody>
+          <a:bodyPr rtlCol="0" anchor="ctr"/>
+          <a:lstStyle/>
+          <a:p>
+            <a:pPr algn="ctr"/>
+            <a:endParaRPr lang="en-CA"/>
+          </a:p>
+        </p:txBody>
+      </p:sp>
+      <p:sp>
+        <p:nvSpPr>
+          <p:cNvPr id="7" name="Oval 6">
+            <a:extLst>
+              <a:ext uri="{FF2B5EF4-FFF2-40B4-BE49-F238E27FC236}">
+                <a16:creationId xmlns:a16="http://schemas.microsoft.com/office/drawing/2014/main" id="{DE9EC2B4-9620-A25E-0BCC-EB3030828854}"/>
+              </a:ext>
+            </a:extLst>
+          </p:cNvPr>
+          <p:cNvSpPr/>
+          <p:nvPr/>
+        </p:nvSpPr>
+        <p:spPr>
+          <a:xfrm>
+            <a:off x="747252" y="1418303"/>
+            <a:ext cx="521110" cy="521110"/>
+          </a:xfrm>
+          <a:prstGeom prst="ellipse">
+            <a:avLst/>
+          </a:prstGeom>
+          <a:solidFill>
+            <a:srgbClr val="92D050"/>
+          </a:solidFill>
+        </p:spPr>
+        <p:style>
+          <a:lnRef idx="2">
+            <a:schemeClr val="accent1">
+              <a:shade val="15000"/>
+            </a:schemeClr>
+          </a:lnRef>
+          <a:fillRef idx="1">
+            <a:schemeClr val="accent1"/>
+          </a:fillRef>
+          <a:effectRef idx="0">
+            <a:schemeClr val="accent1"/>
+          </a:effectRef>
+          <a:fontRef idx="minor">
+            <a:schemeClr val="lt1"/>
+          </a:fontRef>
+        </p:style>
+        <p:txBody>
+          <a:bodyPr rtlCol="0" anchor="ctr"/>
+          <a:lstStyle/>
+          <a:p>
+            <a:pPr algn="ctr"/>
+            <a:endParaRPr lang="en-CA"/>
+          </a:p>
+        </p:txBody>
+      </p:sp>
+      <p:sp>
+        <p:nvSpPr>
+          <p:cNvPr id="8" name="Oval 7">
+            <a:extLst>
+              <a:ext uri="{FF2B5EF4-FFF2-40B4-BE49-F238E27FC236}">
+                <a16:creationId xmlns:a16="http://schemas.microsoft.com/office/drawing/2014/main" id="{D10CE0F2-280F-9A31-2B88-F1C92C6DD1F7}"/>
+              </a:ext>
+            </a:extLst>
+          </p:cNvPr>
+          <p:cNvSpPr/>
+          <p:nvPr/>
+        </p:nvSpPr>
+        <p:spPr>
+          <a:xfrm>
+            <a:off x="757084" y="2305662"/>
+            <a:ext cx="521110" cy="521110"/>
+          </a:xfrm>
+          <a:prstGeom prst="ellipse">
+            <a:avLst/>
+          </a:prstGeom>
+          <a:solidFill>
+            <a:srgbClr val="92D050"/>
+          </a:solidFill>
+        </p:spPr>
+        <p:style>
+          <a:lnRef idx="2">
+            <a:schemeClr val="accent1">
+              <a:shade val="15000"/>
+            </a:schemeClr>
+          </a:lnRef>
+          <a:fillRef idx="1">
+            <a:schemeClr val="accent1"/>
+          </a:fillRef>
+          <a:effectRef idx="0">
+            <a:schemeClr val="accent1"/>
+          </a:effectRef>
+          <a:fontRef idx="minor">
+            <a:schemeClr val="lt1"/>
+          </a:fontRef>
+        </p:style>
+        <p:txBody>
+          <a:bodyPr rtlCol="0" anchor="ctr"/>
+          <a:lstStyle/>
+          <a:p>
+            <a:pPr algn="ctr"/>
+            <a:endParaRPr lang="en-CA"/>
+          </a:p>
+        </p:txBody>
+      </p:sp>
+      <p:sp>
+        <p:nvSpPr>
+          <p:cNvPr id="9" name="Oval 8">
+            <a:extLst>
+              <a:ext uri="{FF2B5EF4-FFF2-40B4-BE49-F238E27FC236}">
+                <a16:creationId xmlns:a16="http://schemas.microsoft.com/office/drawing/2014/main" id="{E6C37F7D-DEFB-578E-58D1-43ACC5CEBE43}"/>
+              </a:ext>
+            </a:extLst>
+          </p:cNvPr>
+          <p:cNvSpPr/>
+          <p:nvPr/>
+        </p:nvSpPr>
+        <p:spPr>
+          <a:xfrm>
+            <a:off x="757084" y="3244643"/>
+            <a:ext cx="521110" cy="521110"/>
+          </a:xfrm>
+          <a:prstGeom prst="ellipse">
+            <a:avLst/>
+          </a:prstGeom>
+          <a:solidFill>
+            <a:srgbClr val="92D050"/>
+          </a:solidFill>
+        </p:spPr>
+        <p:style>
+          <a:lnRef idx="2">
+            <a:schemeClr val="accent1">
+              <a:shade val="15000"/>
+            </a:schemeClr>
+          </a:lnRef>
+          <a:fillRef idx="1">
+            <a:schemeClr val="accent1"/>
+          </a:fillRef>
+          <a:effectRef idx="0">
+            <a:schemeClr val="accent1"/>
+          </a:effectRef>
+          <a:fontRef idx="minor">
+            <a:schemeClr val="lt1"/>
+          </a:fontRef>
+        </p:style>
+        <p:txBody>
+          <a:bodyPr rtlCol="0" anchor="ctr"/>
+          <a:lstStyle/>
+          <a:p>
+            <a:pPr algn="ctr"/>
+            <a:endParaRPr lang="en-CA"/>
+          </a:p>
+        </p:txBody>
+      </p:sp>
+      <p:sp>
+        <p:nvSpPr>
+          <p:cNvPr id="10" name="L-Shape 9">
+            <a:extLst>
+              <a:ext uri="{FF2B5EF4-FFF2-40B4-BE49-F238E27FC236}">
+                <a16:creationId xmlns:a16="http://schemas.microsoft.com/office/drawing/2014/main" id="{96B53D2B-8DCD-810C-47BD-0DF02A5BE16B}"/>
+              </a:ext>
+            </a:extLst>
+          </p:cNvPr>
+          <p:cNvSpPr/>
+          <p:nvPr/>
+        </p:nvSpPr>
+        <p:spPr>
+          <a:xfrm>
+            <a:off x="678426" y="4601496"/>
+            <a:ext cx="2222090" cy="1406013"/>
+          </a:xfrm>
+          <a:prstGeom prst="corner">
+            <a:avLst/>
+          </a:prstGeom>
+        </p:spPr>
+        <p:style>
+          <a:lnRef idx="2">
+            <a:schemeClr val="accent1">
+              <a:shade val="15000"/>
+            </a:schemeClr>
+          </a:lnRef>
+          <a:fillRef idx="1">
+            <a:schemeClr val="accent1"/>
+          </a:fillRef>
+          <a:effectRef idx="0">
+            <a:schemeClr val="accent1"/>
+          </a:effectRef>
+          <a:fontRef idx="minor">
+            <a:schemeClr val="lt1"/>
+          </a:fontRef>
+        </p:style>
+        <p:txBody>
+          <a:bodyPr rtlCol="0" anchor="ctr"/>
+          <a:lstStyle/>
+          <a:p>
+            <a:pPr algn="ctr"/>
+            <a:endParaRPr lang="en-CA"/>
+          </a:p>
+        </p:txBody>
+      </p:sp>
+      <p:cxnSp>
+        <p:nvCxnSpPr>
+          <p:cNvPr id="12" name="Straight Arrow Connector 11">
+            <a:extLst>
+              <a:ext uri="{FF2B5EF4-FFF2-40B4-BE49-F238E27FC236}">
+                <a16:creationId xmlns:a16="http://schemas.microsoft.com/office/drawing/2014/main" id="{F3565B32-12A9-3CC8-6012-C09A0E57902F}"/>
+              </a:ext>
+            </a:extLst>
+          </p:cNvPr>
+          <p:cNvCxnSpPr>
+            <a:stCxn id="6" idx="4"/>
+            <a:endCxn id="7" idx="0"/>
+          </p:cNvCxnSpPr>
+          <p:nvPr/>
+        </p:nvCxnSpPr>
+        <p:spPr>
+          <a:xfrm flipH="1">
+            <a:off x="1007807" y="1017638"/>
+            <a:ext cx="9832" cy="400665"/>
+          </a:xfrm>
+          <a:prstGeom prst="straightConnector1">
+            <a:avLst/>
+          </a:prstGeom>
+          <a:ln w="66675">
+            <a:tailEnd type="none"/>
+          </a:ln>
+        </p:spPr>
+        <p:style>
+          <a:lnRef idx="1">
+            <a:schemeClr val="accent1"/>
+          </a:lnRef>
+          <a:fillRef idx="0">
+            <a:schemeClr val="accent1"/>
+          </a:fillRef>
+          <a:effectRef idx="0">
+            <a:schemeClr val="accent1"/>
+          </a:effectRef>
+          <a:fontRef idx="minor">
+            <a:schemeClr val="tx1"/>
+          </a:fontRef>
+        </p:style>
+      </p:cxnSp>
+      <p:cxnSp>
+        <p:nvCxnSpPr>
+          <p:cNvPr id="13" name="Straight Arrow Connector 12">
+            <a:extLst>
+              <a:ext uri="{FF2B5EF4-FFF2-40B4-BE49-F238E27FC236}">
+                <a16:creationId xmlns:a16="http://schemas.microsoft.com/office/drawing/2014/main" id="{BB02D75D-9ACC-4B8D-D282-81DE91815C15}"/>
+              </a:ext>
+            </a:extLst>
+          </p:cNvPr>
+          <p:cNvCxnSpPr>
+            <a:cxnSpLocks/>
+            <a:stCxn id="7" idx="4"/>
+            <a:endCxn id="8" idx="0"/>
+          </p:cNvCxnSpPr>
+          <p:nvPr/>
+        </p:nvCxnSpPr>
+        <p:spPr>
+          <a:xfrm>
+            <a:off x="1007807" y="1939413"/>
+            <a:ext cx="9832" cy="366249"/>
+          </a:xfrm>
+          <a:prstGeom prst="straightConnector1">
+            <a:avLst/>
+          </a:prstGeom>
+          <a:ln w="66675">
+            <a:tailEnd type="none"/>
+          </a:ln>
+        </p:spPr>
+        <p:style>
+          <a:lnRef idx="1">
+            <a:schemeClr val="accent1"/>
+          </a:lnRef>
+          <a:fillRef idx="0">
+            <a:schemeClr val="accent1"/>
+          </a:fillRef>
+          <a:effectRef idx="0">
+            <a:schemeClr val="accent1"/>
+          </a:effectRef>
+          <a:fontRef idx="minor">
+            <a:schemeClr val="tx1"/>
+          </a:fontRef>
+        </p:style>
+      </p:cxnSp>
+      <p:cxnSp>
+        <p:nvCxnSpPr>
+          <p:cNvPr id="16" name="Straight Arrow Connector 15">
+            <a:extLst>
+              <a:ext uri="{FF2B5EF4-FFF2-40B4-BE49-F238E27FC236}">
+                <a16:creationId xmlns:a16="http://schemas.microsoft.com/office/drawing/2014/main" id="{3031EE19-A94E-02C7-7869-5E2A051F6003}"/>
+              </a:ext>
+            </a:extLst>
+          </p:cNvPr>
+          <p:cNvCxnSpPr>
+            <a:cxnSpLocks/>
+            <a:stCxn id="8" idx="4"/>
+            <a:endCxn id="9" idx="0"/>
+          </p:cNvCxnSpPr>
+          <p:nvPr/>
+        </p:nvCxnSpPr>
+        <p:spPr>
+          <a:xfrm>
+            <a:off x="1017639" y="2826772"/>
+            <a:ext cx="0" cy="417871"/>
+          </a:xfrm>
+          <a:prstGeom prst="straightConnector1">
+            <a:avLst/>
+          </a:prstGeom>
+          <a:ln w="66675">
+            <a:tailEnd type="none"/>
+          </a:ln>
+        </p:spPr>
+        <p:style>
+          <a:lnRef idx="1">
+            <a:schemeClr val="accent1"/>
+          </a:lnRef>
+          <a:fillRef idx="0">
+            <a:schemeClr val="accent1"/>
+          </a:fillRef>
+          <a:effectRef idx="0">
+            <a:schemeClr val="accent1"/>
+          </a:effectRef>
+          <a:fontRef idx="minor">
+            <a:schemeClr val="tx1"/>
+          </a:fontRef>
+        </p:style>
+      </p:cxnSp>
+      <p:cxnSp>
+        <p:nvCxnSpPr>
+          <p:cNvPr id="19" name="Straight Arrow Connector 18">
+            <a:extLst>
+              <a:ext uri="{FF2B5EF4-FFF2-40B4-BE49-F238E27FC236}">
+                <a16:creationId xmlns:a16="http://schemas.microsoft.com/office/drawing/2014/main" id="{1BCB6B7C-29FA-D851-1F26-1D1D5FBF74F6}"/>
+              </a:ext>
+            </a:extLst>
+          </p:cNvPr>
+          <p:cNvCxnSpPr>
+            <a:cxnSpLocks/>
+            <a:stCxn id="9" idx="4"/>
+            <a:endCxn id="10" idx="3"/>
+          </p:cNvCxnSpPr>
+          <p:nvPr/>
+        </p:nvCxnSpPr>
+        <p:spPr>
+          <a:xfrm>
+            <a:off x="1017639" y="3765753"/>
+            <a:ext cx="12290" cy="835743"/>
+          </a:xfrm>
+          <a:prstGeom prst="straightConnector1">
+            <a:avLst/>
+          </a:prstGeom>
+          <a:ln w="66675">
+            <a:tailEnd type="none"/>
+          </a:ln>
+        </p:spPr>
+        <p:style>
+          <a:lnRef idx="1">
+            <a:schemeClr val="accent1"/>
+          </a:lnRef>
+          <a:fillRef idx="0">
+            <a:schemeClr val="accent1"/>
+          </a:fillRef>
+          <a:effectRef idx="0">
+            <a:schemeClr val="accent1"/>
+          </a:effectRef>
+          <a:fontRef idx="minor">
+            <a:schemeClr val="tx1"/>
+          </a:fontRef>
+        </p:style>
+      </p:cxnSp>
+      <p:sp>
+        <p:nvSpPr>
+          <p:cNvPr id="23" name="L-Shape 22">
+            <a:extLst>
+              <a:ext uri="{FF2B5EF4-FFF2-40B4-BE49-F238E27FC236}">
+                <a16:creationId xmlns:a16="http://schemas.microsoft.com/office/drawing/2014/main" id="{D395BC5C-2AB7-37EC-E260-9ACCF8F8BE99}"/>
+              </a:ext>
+            </a:extLst>
+          </p:cNvPr>
+          <p:cNvSpPr/>
+          <p:nvPr/>
+        </p:nvSpPr>
+        <p:spPr>
+          <a:xfrm>
+            <a:off x="6966156" y="3008670"/>
+            <a:ext cx="2222090" cy="1406013"/>
+          </a:xfrm>
+          <a:prstGeom prst="corner">
+            <a:avLst/>
+          </a:prstGeom>
+        </p:spPr>
+        <p:style>
+          <a:lnRef idx="2">
+            <a:schemeClr val="accent1">
+              <a:shade val="15000"/>
+            </a:schemeClr>
+          </a:lnRef>
+          <a:fillRef idx="1">
+            <a:schemeClr val="accent1"/>
+          </a:fillRef>
+          <a:effectRef idx="0">
+            <a:schemeClr val="accent1"/>
+          </a:effectRef>
+          <a:fontRef idx="minor">
+            <a:schemeClr val="lt1"/>
+          </a:fontRef>
+        </p:style>
+        <p:txBody>
+          <a:bodyPr rtlCol="0" anchor="ctr"/>
+          <a:lstStyle/>
+          <a:p>
+            <a:pPr algn="ctr"/>
+            <a:endParaRPr lang="en-CA"/>
+          </a:p>
+        </p:txBody>
+      </p:sp>
+      <p:sp>
+        <p:nvSpPr>
+          <p:cNvPr id="26" name="Oval 25">
+            <a:extLst>
+              <a:ext uri="{FF2B5EF4-FFF2-40B4-BE49-F238E27FC236}">
+                <a16:creationId xmlns:a16="http://schemas.microsoft.com/office/drawing/2014/main" id="{E0DCA670-B4B8-1DC1-A800-1D3FAFFB23CD}"/>
+              </a:ext>
+            </a:extLst>
+          </p:cNvPr>
+          <p:cNvSpPr/>
+          <p:nvPr/>
+        </p:nvSpPr>
+        <p:spPr>
+          <a:xfrm>
+            <a:off x="6966156" y="5338913"/>
+            <a:ext cx="521110" cy="521110"/>
+          </a:xfrm>
+          <a:prstGeom prst="ellipse">
+            <a:avLst/>
+          </a:prstGeom>
+          <a:solidFill>
+            <a:srgbClr val="92D050"/>
+          </a:solidFill>
+        </p:spPr>
+        <p:style>
+          <a:lnRef idx="2">
+            <a:schemeClr val="accent1">
+              <a:shade val="15000"/>
+            </a:schemeClr>
+          </a:lnRef>
+          <a:fillRef idx="1">
+            <a:schemeClr val="accent1"/>
+          </a:fillRef>
+          <a:effectRef idx="0">
+            <a:schemeClr val="accent1"/>
+          </a:effectRef>
+          <a:fontRef idx="minor">
+            <a:schemeClr val="lt1"/>
+          </a:fontRef>
+        </p:style>
+        <p:txBody>
+          <a:bodyPr rtlCol="0" anchor="ctr"/>
+          <a:lstStyle/>
+          <a:p>
+            <a:pPr algn="ctr"/>
+            <a:endParaRPr lang="en-CA"/>
+          </a:p>
+        </p:txBody>
+      </p:sp>
+      <p:sp>
+        <p:nvSpPr>
+          <p:cNvPr id="29" name="Oval 28">
+            <a:extLst>
+              <a:ext uri="{FF2B5EF4-FFF2-40B4-BE49-F238E27FC236}">
+                <a16:creationId xmlns:a16="http://schemas.microsoft.com/office/drawing/2014/main" id="{23EE547C-7FFE-109F-099D-787A16AC3C01}"/>
+              </a:ext>
+            </a:extLst>
+          </p:cNvPr>
+          <p:cNvSpPr/>
+          <p:nvPr/>
+        </p:nvSpPr>
+        <p:spPr>
+          <a:xfrm>
+            <a:off x="8662219" y="5365953"/>
+            <a:ext cx="521110" cy="521110"/>
+          </a:xfrm>
+          <a:prstGeom prst="ellipse">
+            <a:avLst/>
+          </a:prstGeom>
+          <a:solidFill>
+            <a:srgbClr val="92D050"/>
+          </a:solidFill>
+        </p:spPr>
+        <p:style>
+          <a:lnRef idx="2">
+            <a:schemeClr val="accent1">
+              <a:shade val="15000"/>
+            </a:schemeClr>
+          </a:lnRef>
+          <a:fillRef idx="1">
+            <a:schemeClr val="accent1"/>
+          </a:fillRef>
+          <a:effectRef idx="0">
+            <a:schemeClr val="accent1"/>
+          </a:effectRef>
+          <a:fontRef idx="minor">
+            <a:schemeClr val="lt1"/>
+          </a:fontRef>
+        </p:style>
+        <p:txBody>
+          <a:bodyPr rtlCol="0" anchor="ctr"/>
+          <a:lstStyle/>
+          <a:p>
+            <a:pPr algn="ctr"/>
+            <a:endParaRPr lang="en-CA"/>
+          </a:p>
+        </p:txBody>
+      </p:sp>
+      <p:sp>
+        <p:nvSpPr>
+          <p:cNvPr id="34" name="Oval 33">
+            <a:extLst>
+              <a:ext uri="{FF2B5EF4-FFF2-40B4-BE49-F238E27FC236}">
+                <a16:creationId xmlns:a16="http://schemas.microsoft.com/office/drawing/2014/main" id="{A1835EE1-485A-9FFB-6455-E68A1BFF6C50}"/>
+              </a:ext>
+            </a:extLst>
+          </p:cNvPr>
+          <p:cNvSpPr/>
+          <p:nvPr/>
+        </p:nvSpPr>
+        <p:spPr>
+          <a:xfrm>
+            <a:off x="6966156" y="4359425"/>
+            <a:ext cx="521110" cy="521110"/>
+          </a:xfrm>
+          <a:prstGeom prst="ellipse">
+            <a:avLst/>
+          </a:prstGeom>
+          <a:solidFill>
+            <a:srgbClr val="92D050"/>
+          </a:solidFill>
+        </p:spPr>
+        <p:style>
+          <a:lnRef idx="2">
+            <a:schemeClr val="accent1">
+              <a:shade val="15000"/>
+            </a:schemeClr>
+          </a:lnRef>
+          <a:fillRef idx="1">
+            <a:schemeClr val="accent1"/>
+          </a:fillRef>
+          <a:effectRef idx="0">
+            <a:schemeClr val="accent1"/>
+          </a:effectRef>
+          <a:fontRef idx="minor">
+            <a:schemeClr val="lt1"/>
+          </a:fontRef>
+        </p:style>
+        <p:txBody>
+          <a:bodyPr rtlCol="0" anchor="ctr"/>
+          <a:lstStyle/>
+          <a:p>
+            <a:pPr algn="ctr"/>
+            <a:endParaRPr lang="en-CA"/>
+          </a:p>
+        </p:txBody>
+      </p:sp>
+      <p:cxnSp>
+        <p:nvCxnSpPr>
+          <p:cNvPr id="35" name="Straight Arrow Connector 34">
+            <a:extLst>
+              <a:ext uri="{FF2B5EF4-FFF2-40B4-BE49-F238E27FC236}">
+                <a16:creationId xmlns:a16="http://schemas.microsoft.com/office/drawing/2014/main" id="{CE3CF986-98A1-3DEC-69AA-7CEE3C9E00CB}"/>
+              </a:ext>
+            </a:extLst>
+          </p:cNvPr>
+          <p:cNvCxnSpPr>
+            <a:cxnSpLocks/>
+            <a:endCxn id="26" idx="0"/>
+          </p:cNvCxnSpPr>
+          <p:nvPr/>
+        </p:nvCxnSpPr>
+        <p:spPr>
+          <a:xfrm flipH="1">
+            <a:off x="7226711" y="4901382"/>
+            <a:ext cx="9834" cy="437531"/>
+          </a:xfrm>
+          <a:prstGeom prst="straightConnector1">
+            <a:avLst/>
+          </a:prstGeom>
+          <a:ln w="66675">
+            <a:tailEnd type="none"/>
+          </a:ln>
+        </p:spPr>
+        <p:style>
+          <a:lnRef idx="1">
+            <a:schemeClr val="accent1"/>
+          </a:lnRef>
+          <a:fillRef idx="0">
+            <a:schemeClr val="accent1"/>
+          </a:fillRef>
+          <a:effectRef idx="0">
+            <a:schemeClr val="accent1"/>
+          </a:effectRef>
+          <a:fontRef idx="minor">
+            <a:schemeClr val="tx1"/>
+          </a:fontRef>
+        </p:style>
+      </p:cxnSp>
+      <p:sp>
+        <p:nvSpPr>
+          <p:cNvPr id="40" name="Oval 39">
+            <a:extLst>
+              <a:ext uri="{FF2B5EF4-FFF2-40B4-BE49-F238E27FC236}">
+                <a16:creationId xmlns:a16="http://schemas.microsoft.com/office/drawing/2014/main" id="{E5967ECD-EDE9-E87C-E724-6B0F201A3C6B}"/>
+              </a:ext>
+            </a:extLst>
+          </p:cNvPr>
+          <p:cNvSpPr/>
+          <p:nvPr/>
+        </p:nvSpPr>
+        <p:spPr>
+          <a:xfrm>
+            <a:off x="8608444" y="4431342"/>
+            <a:ext cx="521110" cy="521110"/>
+          </a:xfrm>
+          <a:prstGeom prst="ellipse">
+            <a:avLst/>
+          </a:prstGeom>
+          <a:solidFill>
+            <a:srgbClr val="92D050"/>
+          </a:solidFill>
+        </p:spPr>
+        <p:style>
+          <a:lnRef idx="2">
+            <a:schemeClr val="accent1">
+              <a:shade val="15000"/>
+            </a:schemeClr>
+          </a:lnRef>
+          <a:fillRef idx="1">
+            <a:schemeClr val="accent1"/>
+          </a:fillRef>
+          <a:effectRef idx="0">
+            <a:schemeClr val="accent1"/>
+          </a:effectRef>
+          <a:fontRef idx="minor">
+            <a:schemeClr val="lt1"/>
+          </a:fontRef>
+        </p:style>
+        <p:txBody>
+          <a:bodyPr rtlCol="0" anchor="ctr"/>
+          <a:lstStyle/>
+          <a:p>
+            <a:pPr algn="ctr"/>
+            <a:endParaRPr lang="en-CA"/>
+          </a:p>
+        </p:txBody>
+      </p:sp>
+      <p:cxnSp>
+        <p:nvCxnSpPr>
+          <p:cNvPr id="41" name="Straight Arrow Connector 40">
+            <a:extLst>
+              <a:ext uri="{FF2B5EF4-FFF2-40B4-BE49-F238E27FC236}">
+                <a16:creationId xmlns:a16="http://schemas.microsoft.com/office/drawing/2014/main" id="{F279DDBF-E94A-6ED1-FF13-CAF47161900A}"/>
+              </a:ext>
+            </a:extLst>
+          </p:cNvPr>
+          <p:cNvCxnSpPr>
+            <a:cxnSpLocks/>
+            <a:endCxn id="29" idx="0"/>
+          </p:cNvCxnSpPr>
+          <p:nvPr/>
+        </p:nvCxnSpPr>
+        <p:spPr>
+          <a:xfrm>
+            <a:off x="8893280" y="4901382"/>
+            <a:ext cx="29494" cy="464571"/>
+          </a:xfrm>
+          <a:prstGeom prst="straightConnector1">
+            <a:avLst/>
+          </a:prstGeom>
+          <a:ln w="66675">
+            <a:tailEnd type="none"/>
+          </a:ln>
+        </p:spPr>
+        <p:style>
+          <a:lnRef idx="1">
+            <a:schemeClr val="accent1"/>
+          </a:lnRef>
+          <a:fillRef idx="0">
+            <a:schemeClr val="accent1"/>
+          </a:fillRef>
+          <a:effectRef idx="0">
+            <a:schemeClr val="accent1"/>
+          </a:effectRef>
+          <a:fontRef idx="minor">
+            <a:schemeClr val="tx1"/>
+          </a:fontRef>
+        </p:style>
+      </p:cxnSp>
+      <p:sp>
+        <p:nvSpPr>
+          <p:cNvPr id="42" name="Cube 41">
+            <a:extLst>
+              <a:ext uri="{FF2B5EF4-FFF2-40B4-BE49-F238E27FC236}">
+                <a16:creationId xmlns:a16="http://schemas.microsoft.com/office/drawing/2014/main" id="{ED5DCC3B-21D0-0488-7E32-FF1493087257}"/>
+              </a:ext>
+            </a:extLst>
+          </p:cNvPr>
+          <p:cNvSpPr/>
+          <p:nvPr/>
+        </p:nvSpPr>
+        <p:spPr>
+          <a:xfrm rot="19164041">
+            <a:off x="1685593" y="769628"/>
+            <a:ext cx="734649" cy="753264"/>
+          </a:xfrm>
+          <a:prstGeom prst="cube">
+            <a:avLst>
+              <a:gd name="adj" fmla="val 75671"/>
+            </a:avLst>
+          </a:prstGeom>
+          <a:solidFill>
+            <a:srgbClr val="7030A0"/>
+          </a:solidFill>
+        </p:spPr>
+        <p:style>
+          <a:lnRef idx="2">
+            <a:schemeClr val="accent1">
+              <a:shade val="15000"/>
+            </a:schemeClr>
+          </a:lnRef>
+          <a:fillRef idx="1">
+            <a:schemeClr val="accent1"/>
+          </a:fillRef>
+          <a:effectRef idx="0">
+            <a:schemeClr val="accent1"/>
+          </a:effectRef>
+          <a:fontRef idx="minor">
+            <a:schemeClr val="lt1"/>
+          </a:fontRef>
+        </p:style>
+        <p:txBody>
+          <a:bodyPr rtlCol="0" anchor="ctr"/>
+          <a:lstStyle/>
+          <a:p>
+            <a:pPr algn="ctr"/>
+            <a:endParaRPr lang="en-CA"/>
+          </a:p>
+        </p:txBody>
+      </p:sp>
+      <p:sp>
+        <p:nvSpPr>
+          <p:cNvPr id="44" name="Oval 43">
+            <a:extLst>
+              <a:ext uri="{FF2B5EF4-FFF2-40B4-BE49-F238E27FC236}">
+                <a16:creationId xmlns:a16="http://schemas.microsoft.com/office/drawing/2014/main" id="{CF449D9A-F0D6-8D70-875F-E4FD9A9FA305}"/>
+              </a:ext>
+            </a:extLst>
+          </p:cNvPr>
+          <p:cNvSpPr/>
+          <p:nvPr/>
+        </p:nvSpPr>
+        <p:spPr>
+          <a:xfrm>
+            <a:off x="1792362" y="329381"/>
+            <a:ext cx="521110" cy="521110"/>
+          </a:xfrm>
+          <a:prstGeom prst="ellipse">
+            <a:avLst/>
+          </a:prstGeom>
+          <a:solidFill>
+            <a:srgbClr val="92D050"/>
+          </a:solidFill>
+        </p:spPr>
+        <p:style>
+          <a:lnRef idx="2">
+            <a:schemeClr val="accent1">
+              <a:shade val="15000"/>
+            </a:schemeClr>
+          </a:lnRef>
+          <a:fillRef idx="1">
+            <a:schemeClr val="accent1"/>
+          </a:fillRef>
+          <a:effectRef idx="0">
+            <a:schemeClr val="accent1"/>
+          </a:effectRef>
+          <a:fontRef idx="minor">
+            <a:schemeClr val="lt1"/>
+          </a:fontRef>
+        </p:style>
+        <p:txBody>
+          <a:bodyPr rtlCol="0" anchor="ctr"/>
+          <a:lstStyle/>
+          <a:p>
+            <a:pPr algn="ctr"/>
+            <a:endParaRPr lang="en-CA"/>
+          </a:p>
+        </p:txBody>
+      </p:sp>
+      <p:sp>
+        <p:nvSpPr>
+          <p:cNvPr id="47" name="Oval 46">
+            <a:extLst>
+              <a:ext uri="{FF2B5EF4-FFF2-40B4-BE49-F238E27FC236}">
+                <a16:creationId xmlns:a16="http://schemas.microsoft.com/office/drawing/2014/main" id="{1A718BB3-7256-CBDD-20AC-00C6EE6E3282}"/>
+              </a:ext>
+            </a:extLst>
+          </p:cNvPr>
+          <p:cNvSpPr/>
+          <p:nvPr/>
+        </p:nvSpPr>
+        <p:spPr>
+          <a:xfrm>
+            <a:off x="2992054" y="1418303"/>
+            <a:ext cx="521110" cy="521110"/>
+          </a:xfrm>
+          <a:prstGeom prst="ellipse">
+            <a:avLst/>
+          </a:prstGeom>
+          <a:solidFill>
+            <a:srgbClr val="92D050"/>
+          </a:solidFill>
+        </p:spPr>
+        <p:style>
+          <a:lnRef idx="2">
+            <a:schemeClr val="accent1">
+              <a:shade val="15000"/>
+            </a:schemeClr>
+          </a:lnRef>
+          <a:fillRef idx="1">
+            <a:schemeClr val="accent1"/>
+          </a:fillRef>
+          <a:effectRef idx="0">
+            <a:schemeClr val="accent1"/>
+          </a:effectRef>
+          <a:fontRef idx="minor">
+            <a:schemeClr val="lt1"/>
+          </a:fontRef>
+        </p:style>
+        <p:txBody>
+          <a:bodyPr rtlCol="0" anchor="ctr"/>
+          <a:lstStyle/>
+          <a:p>
+            <a:pPr algn="ctr"/>
+            <a:endParaRPr lang="en-CA"/>
+          </a:p>
+        </p:txBody>
+      </p:sp>
+      <p:cxnSp>
+        <p:nvCxnSpPr>
+          <p:cNvPr id="3" name="Straight Arrow Connector 2">
+            <a:extLst>
+              <a:ext uri="{FF2B5EF4-FFF2-40B4-BE49-F238E27FC236}">
+                <a16:creationId xmlns:a16="http://schemas.microsoft.com/office/drawing/2014/main" id="{72A2CC15-CF8F-F57A-5F27-BAAE3EA6FD50}"/>
+              </a:ext>
+            </a:extLst>
+          </p:cNvPr>
+          <p:cNvCxnSpPr>
+            <a:cxnSpLocks/>
+            <a:stCxn id="5" idx="4"/>
+            <a:endCxn id="17" idx="1"/>
+          </p:cNvCxnSpPr>
+          <p:nvPr/>
+        </p:nvCxnSpPr>
+        <p:spPr>
+          <a:xfrm flipV="1">
+            <a:off x="3817425" y="3180304"/>
+            <a:ext cx="1833780" cy="1898054"/>
+          </a:xfrm>
+          <a:prstGeom prst="straightConnector1">
+            <a:avLst/>
+          </a:prstGeom>
+          <a:ln w="66675">
+            <a:tailEnd type="none"/>
+          </a:ln>
+        </p:spPr>
+        <p:style>
+          <a:lnRef idx="1">
+            <a:schemeClr val="accent1"/>
+          </a:lnRef>
+          <a:fillRef idx="0">
+            <a:schemeClr val="accent1"/>
+          </a:fillRef>
+          <a:effectRef idx="0">
+            <a:schemeClr val="accent1"/>
+          </a:effectRef>
+          <a:fontRef idx="minor">
+            <a:schemeClr val="tx1"/>
+          </a:fontRef>
+        </p:style>
+      </p:cxnSp>
+      <p:sp>
+        <p:nvSpPr>
+          <p:cNvPr id="4" name="Oval 3">
+            <a:extLst>
+              <a:ext uri="{FF2B5EF4-FFF2-40B4-BE49-F238E27FC236}">
+                <a16:creationId xmlns:a16="http://schemas.microsoft.com/office/drawing/2014/main" id="{213DD8E3-AF34-4186-3CFF-343B4FE9F897}"/>
+              </a:ext>
+            </a:extLst>
+          </p:cNvPr>
+          <p:cNvSpPr/>
+          <p:nvPr/>
+        </p:nvSpPr>
+        <p:spPr>
+          <a:xfrm rot="16200000">
+            <a:off x="5474652" y="4798909"/>
+            <a:ext cx="521110" cy="521110"/>
+          </a:xfrm>
+          <a:prstGeom prst="ellipse">
+            <a:avLst/>
+          </a:prstGeom>
+          <a:solidFill>
+            <a:srgbClr val="92D050"/>
+          </a:solidFill>
+        </p:spPr>
+        <p:style>
+          <a:lnRef idx="2">
+            <a:schemeClr val="accent1">
+              <a:shade val="15000"/>
+            </a:schemeClr>
+          </a:lnRef>
+          <a:fillRef idx="1">
+            <a:schemeClr val="accent1"/>
+          </a:fillRef>
+          <a:effectRef idx="0">
+            <a:schemeClr val="accent1"/>
+          </a:effectRef>
+          <a:fontRef idx="minor">
+            <a:schemeClr val="lt1"/>
+          </a:fontRef>
+        </p:style>
+        <p:txBody>
+          <a:bodyPr rtlCol="0" anchor="ctr"/>
+          <a:lstStyle/>
+          <a:p>
+            <a:pPr algn="ctr"/>
+            <a:endParaRPr lang="en-CA"/>
+          </a:p>
+        </p:txBody>
+      </p:sp>
+      <p:sp>
+        <p:nvSpPr>
+          <p:cNvPr id="5" name="Oval 4">
+            <a:extLst>
+              <a:ext uri="{FF2B5EF4-FFF2-40B4-BE49-F238E27FC236}">
+                <a16:creationId xmlns:a16="http://schemas.microsoft.com/office/drawing/2014/main" id="{6F734B16-2164-C4F1-3256-F4E20B1C4D95}"/>
+              </a:ext>
+            </a:extLst>
+          </p:cNvPr>
+          <p:cNvSpPr/>
+          <p:nvPr/>
+        </p:nvSpPr>
+        <p:spPr>
+          <a:xfrm rot="16200000">
+            <a:off x="3296315" y="4817803"/>
+            <a:ext cx="521110" cy="521110"/>
+          </a:xfrm>
+          <a:prstGeom prst="ellipse">
+            <a:avLst/>
+          </a:prstGeom>
+          <a:solidFill>
+            <a:srgbClr val="92D050"/>
+          </a:solidFill>
+        </p:spPr>
+        <p:style>
+          <a:lnRef idx="2">
+            <a:schemeClr val="accent1">
+              <a:shade val="15000"/>
+            </a:schemeClr>
+          </a:lnRef>
+          <a:fillRef idx="1">
+            <a:schemeClr val="accent1"/>
+          </a:fillRef>
+          <a:effectRef idx="0">
+            <a:schemeClr val="accent1"/>
+          </a:effectRef>
+          <a:fontRef idx="minor">
+            <a:schemeClr val="lt1"/>
+          </a:fontRef>
+        </p:style>
+        <p:txBody>
+          <a:bodyPr rtlCol="0" anchor="ctr"/>
+          <a:lstStyle/>
+          <a:p>
+            <a:pPr algn="ctr"/>
+            <a:endParaRPr lang="en-CA"/>
+          </a:p>
+        </p:txBody>
+      </p:sp>
+      <p:sp>
+        <p:nvSpPr>
+          <p:cNvPr id="11" name="Oval 10">
+            <a:extLst>
+              <a:ext uri="{FF2B5EF4-FFF2-40B4-BE49-F238E27FC236}">
+                <a16:creationId xmlns:a16="http://schemas.microsoft.com/office/drawing/2014/main" id="{7B4C8F7D-5AAE-F19C-1092-A896D9BE0ADD}"/>
+              </a:ext>
+            </a:extLst>
+          </p:cNvPr>
+          <p:cNvSpPr/>
+          <p:nvPr/>
+        </p:nvSpPr>
+        <p:spPr>
+          <a:xfrm rot="16200000">
+            <a:off x="3296315" y="3311101"/>
+            <a:ext cx="521110" cy="521110"/>
+          </a:xfrm>
+          <a:prstGeom prst="ellipse">
+            <a:avLst/>
+          </a:prstGeom>
+          <a:solidFill>
+            <a:srgbClr val="92D050"/>
+          </a:solidFill>
+        </p:spPr>
+        <p:style>
+          <a:lnRef idx="2">
+            <a:schemeClr val="accent1">
+              <a:shade val="15000"/>
+            </a:schemeClr>
+          </a:lnRef>
+          <a:fillRef idx="1">
+            <a:schemeClr val="accent1"/>
+          </a:fillRef>
+          <a:effectRef idx="0">
+            <a:schemeClr val="accent1"/>
+          </a:effectRef>
+          <a:fontRef idx="minor">
+            <a:schemeClr val="lt1"/>
+          </a:fontRef>
+        </p:style>
+        <p:txBody>
+          <a:bodyPr rtlCol="0" anchor="ctr"/>
+          <a:lstStyle/>
+          <a:p>
+            <a:pPr algn="ctr"/>
+            <a:endParaRPr lang="en-CA"/>
+          </a:p>
+        </p:txBody>
+      </p:sp>
+      <p:cxnSp>
+        <p:nvCxnSpPr>
+          <p:cNvPr id="14" name="Straight Arrow Connector 13">
+            <a:extLst>
+              <a:ext uri="{FF2B5EF4-FFF2-40B4-BE49-F238E27FC236}">
+                <a16:creationId xmlns:a16="http://schemas.microsoft.com/office/drawing/2014/main" id="{AE07E1BB-3AAD-3D76-A579-9C5039C409BA}"/>
+              </a:ext>
+            </a:extLst>
+          </p:cNvPr>
+          <p:cNvCxnSpPr>
+            <a:cxnSpLocks/>
+            <a:stCxn id="11" idx="2"/>
+            <a:endCxn id="5" idx="6"/>
+          </p:cNvCxnSpPr>
+          <p:nvPr/>
+        </p:nvCxnSpPr>
+        <p:spPr>
+          <a:xfrm>
+            <a:off x="3556870" y="3832211"/>
+            <a:ext cx="0" cy="985592"/>
+          </a:xfrm>
+          <a:prstGeom prst="straightConnector1">
+            <a:avLst/>
+          </a:prstGeom>
+          <a:ln w="66675">
+            <a:tailEnd type="none"/>
+          </a:ln>
+        </p:spPr>
+        <p:style>
+          <a:lnRef idx="1">
+            <a:schemeClr val="accent1"/>
+          </a:lnRef>
+          <a:fillRef idx="0">
+            <a:schemeClr val="accent1"/>
+          </a:fillRef>
+          <a:effectRef idx="0">
+            <a:schemeClr val="accent1"/>
+          </a:effectRef>
+          <a:fontRef idx="minor">
+            <a:schemeClr val="tx1"/>
+          </a:fontRef>
+        </p:style>
+      </p:cxnSp>
+      <p:sp>
+        <p:nvSpPr>
+          <p:cNvPr id="17" name="Oval 16">
+            <a:extLst>
+              <a:ext uri="{FF2B5EF4-FFF2-40B4-BE49-F238E27FC236}">
+                <a16:creationId xmlns:a16="http://schemas.microsoft.com/office/drawing/2014/main" id="{6FFE5FF4-6E52-112E-920C-F8452DAA8484}"/>
+              </a:ext>
+            </a:extLst>
+          </p:cNvPr>
+          <p:cNvSpPr/>
+          <p:nvPr/>
+        </p:nvSpPr>
+        <p:spPr>
+          <a:xfrm rot="16200000">
+            <a:off x="5574890" y="2735509"/>
+            <a:ext cx="521110" cy="521110"/>
+          </a:xfrm>
+          <a:prstGeom prst="ellipse">
+            <a:avLst/>
+          </a:prstGeom>
+          <a:solidFill>
+            <a:srgbClr val="92D050"/>
+          </a:solidFill>
+        </p:spPr>
+        <p:style>
+          <a:lnRef idx="2">
+            <a:schemeClr val="accent1">
+              <a:shade val="15000"/>
+            </a:schemeClr>
+          </a:lnRef>
+          <a:fillRef idx="1">
+            <a:schemeClr val="accent1"/>
+          </a:fillRef>
+          <a:effectRef idx="0">
+            <a:schemeClr val="accent1"/>
+          </a:effectRef>
+          <a:fontRef idx="minor">
+            <a:schemeClr val="lt1"/>
+          </a:fontRef>
+        </p:style>
+        <p:txBody>
+          <a:bodyPr rtlCol="0" anchor="ctr"/>
+          <a:lstStyle/>
+          <a:p>
+            <a:pPr algn="ctr"/>
+            <a:endParaRPr lang="en-CA"/>
+          </a:p>
+        </p:txBody>
+      </p:sp>
+      <p:cxnSp>
+        <p:nvCxnSpPr>
+          <p:cNvPr id="21" name="Straight Arrow Connector 20">
+            <a:extLst>
+              <a:ext uri="{FF2B5EF4-FFF2-40B4-BE49-F238E27FC236}">
+                <a16:creationId xmlns:a16="http://schemas.microsoft.com/office/drawing/2014/main" id="{E5DBDDAF-764F-765C-A751-83F94305B5A0}"/>
+              </a:ext>
+            </a:extLst>
+          </p:cNvPr>
+          <p:cNvCxnSpPr>
+            <a:cxnSpLocks/>
+            <a:stCxn id="40" idx="2"/>
+            <a:endCxn id="34" idx="6"/>
+          </p:cNvCxnSpPr>
+          <p:nvPr/>
+        </p:nvCxnSpPr>
+        <p:spPr>
+          <a:xfrm flipH="1" flipV="1">
+            <a:off x="7487266" y="4619980"/>
+            <a:ext cx="1121178" cy="71917"/>
+          </a:xfrm>
+          <a:prstGeom prst="straightConnector1">
+            <a:avLst/>
+          </a:prstGeom>
+          <a:ln w="66675">
+            <a:tailEnd type="none"/>
+          </a:ln>
+        </p:spPr>
+        <p:style>
+          <a:lnRef idx="1">
+            <a:schemeClr val="accent1"/>
+          </a:lnRef>
+          <a:fillRef idx="0">
+            <a:schemeClr val="accent1"/>
+          </a:fillRef>
+          <a:effectRef idx="0">
+            <a:schemeClr val="accent1"/>
+          </a:effectRef>
+          <a:fontRef idx="minor">
+            <a:schemeClr val="tx1"/>
+          </a:fontRef>
+        </p:style>
+      </p:cxnSp>
+    </p:spTree>
+    <p:extLst>
+      <p:ext uri="{BB962C8B-B14F-4D97-AF65-F5344CB8AC3E}">
+        <p14:creationId xmlns:p14="http://schemas.microsoft.com/office/powerpoint/2010/main" val="2190351829"/>
       </p:ext>
     </p:extLst>
   </p:cSld>

</xml_diff>